<commit_message>
Preprocessing Delivery version 2 <updated version>
</commit_message>
<xml_diff>
--- a/sample_maps.pptx
+++ b/sample_maps.pptx
@@ -6,6 +6,9 @@
   </p:sldMasterIdLst>
   <p:sldIdLst>
     <p:sldId id="256" r:id="rId2"/>
+    <p:sldId id="257" r:id="rId3"/>
+    <p:sldId id="258" r:id="rId4"/>
+    <p:sldId id="259" r:id="rId5"/>
   </p:sldIdLst>
   <p:sldSz cx="12192000" cy="6858000"/>
   <p:notesSz cx="6858000" cy="9144000"/>
@@ -104,6 +107,11 @@
       </a:defRPr>
     </a:lvl9pPr>
   </p:defaultTextStyle>
+  <p:extLst>
+    <p:ext uri="{EFAFB233-063F-42B5-8137-9DF3F51BA10A}">
+      <p15:sldGuideLst xmlns:p15="http://schemas.microsoft.com/office/powerpoint/2012/main"/>
+    </p:ext>
+  </p:extLst>
 </p:presentation>
 </file>
 
@@ -238,7 +246,7 @@
           <a:p>
             <a:fld id="{1F35354B-CEDA-4122-BD5C-84A48085FB12}" type="datetimeFigureOut">
               <a:rPr lang="nl-NL" smtClean="0"/>
-              <a:t>18-10-2020</a:t>
+              <a:t>24-10-2020</a:t>
             </a:fld>
             <a:endParaRPr lang="nl-NL"/>
           </a:p>
@@ -408,7 +416,7 @@
           <a:p>
             <a:fld id="{1F35354B-CEDA-4122-BD5C-84A48085FB12}" type="datetimeFigureOut">
               <a:rPr lang="nl-NL" smtClean="0"/>
-              <a:t>18-10-2020</a:t>
+              <a:t>24-10-2020</a:t>
             </a:fld>
             <a:endParaRPr lang="nl-NL"/>
           </a:p>
@@ -588,7 +596,7 @@
           <a:p>
             <a:fld id="{1F35354B-CEDA-4122-BD5C-84A48085FB12}" type="datetimeFigureOut">
               <a:rPr lang="nl-NL" smtClean="0"/>
-              <a:t>18-10-2020</a:t>
+              <a:t>24-10-2020</a:t>
             </a:fld>
             <a:endParaRPr lang="nl-NL"/>
           </a:p>
@@ -758,7 +766,7 @@
           <a:p>
             <a:fld id="{1F35354B-CEDA-4122-BD5C-84A48085FB12}" type="datetimeFigureOut">
               <a:rPr lang="nl-NL" smtClean="0"/>
-              <a:t>18-10-2020</a:t>
+              <a:t>24-10-2020</a:t>
             </a:fld>
             <a:endParaRPr lang="nl-NL"/>
           </a:p>
@@ -1004,7 +1012,7 @@
           <a:p>
             <a:fld id="{1F35354B-CEDA-4122-BD5C-84A48085FB12}" type="datetimeFigureOut">
               <a:rPr lang="nl-NL" smtClean="0"/>
-              <a:t>18-10-2020</a:t>
+              <a:t>24-10-2020</a:t>
             </a:fld>
             <a:endParaRPr lang="nl-NL"/>
           </a:p>
@@ -1236,7 +1244,7 @@
           <a:p>
             <a:fld id="{1F35354B-CEDA-4122-BD5C-84A48085FB12}" type="datetimeFigureOut">
               <a:rPr lang="nl-NL" smtClean="0"/>
-              <a:t>18-10-2020</a:t>
+              <a:t>24-10-2020</a:t>
             </a:fld>
             <a:endParaRPr lang="nl-NL"/>
           </a:p>
@@ -1603,7 +1611,7 @@
           <a:p>
             <a:fld id="{1F35354B-CEDA-4122-BD5C-84A48085FB12}" type="datetimeFigureOut">
               <a:rPr lang="nl-NL" smtClean="0"/>
-              <a:t>18-10-2020</a:t>
+              <a:t>24-10-2020</a:t>
             </a:fld>
             <a:endParaRPr lang="nl-NL"/>
           </a:p>
@@ -1721,7 +1729,7 @@
           <a:p>
             <a:fld id="{1F35354B-CEDA-4122-BD5C-84A48085FB12}" type="datetimeFigureOut">
               <a:rPr lang="nl-NL" smtClean="0"/>
-              <a:t>18-10-2020</a:t>
+              <a:t>24-10-2020</a:t>
             </a:fld>
             <a:endParaRPr lang="nl-NL"/>
           </a:p>
@@ -1816,7 +1824,7 @@
           <a:p>
             <a:fld id="{1F35354B-CEDA-4122-BD5C-84A48085FB12}" type="datetimeFigureOut">
               <a:rPr lang="nl-NL" smtClean="0"/>
-              <a:t>18-10-2020</a:t>
+              <a:t>24-10-2020</a:t>
             </a:fld>
             <a:endParaRPr lang="nl-NL"/>
           </a:p>
@@ -2093,7 +2101,7 @@
           <a:p>
             <a:fld id="{1F35354B-CEDA-4122-BD5C-84A48085FB12}" type="datetimeFigureOut">
               <a:rPr lang="nl-NL" smtClean="0"/>
-              <a:t>18-10-2020</a:t>
+              <a:t>24-10-2020</a:t>
             </a:fld>
             <a:endParaRPr lang="nl-NL"/>
           </a:p>
@@ -2346,7 +2354,7 @@
           <a:p>
             <a:fld id="{1F35354B-CEDA-4122-BD5C-84A48085FB12}" type="datetimeFigureOut">
               <a:rPr lang="nl-NL" smtClean="0"/>
-              <a:t>18-10-2020</a:t>
+              <a:t>24-10-2020</a:t>
             </a:fld>
             <a:endParaRPr lang="nl-NL"/>
           </a:p>
@@ -2559,7 +2567,7 @@
           <a:p>
             <a:fld id="{1F35354B-CEDA-4122-BD5C-84A48085FB12}" type="datetimeFigureOut">
               <a:rPr lang="nl-NL" smtClean="0"/>
-              <a:t>18-10-2020</a:t>
+              <a:t>24-10-2020</a:t>
             </a:fld>
             <a:endParaRPr lang="nl-NL"/>
           </a:p>
@@ -3263,6 +3271,1247 @@
 </p:sld>
 </file>
 
+<file path=ppt/slides/slide2.xml><?xml version="1.0" encoding="utf-8"?>
+<p:sld xmlns:a="http://schemas.openxmlformats.org/drawingml/2006/main" xmlns:r="http://schemas.openxmlformats.org/officeDocument/2006/relationships" xmlns:p="http://schemas.openxmlformats.org/presentationml/2006/main">
+  <p:cSld>
+    <p:spTree>
+      <p:nvGrpSpPr>
+        <p:cNvPr id="1" name=""/>
+        <p:cNvGrpSpPr/>
+        <p:nvPr/>
+      </p:nvGrpSpPr>
+      <p:grpSpPr>
+        <a:xfrm>
+          <a:off x="0" y="0"/>
+          <a:ext cx="0" cy="0"/>
+          <a:chOff x="0" y="0"/>
+          <a:chExt cx="0" cy="0"/>
+        </a:xfrm>
+      </p:grpSpPr>
+      <p:sp>
+        <p:nvSpPr>
+          <p:cNvPr id="4" name="Rectangle 3"/>
+          <p:cNvSpPr/>
+          <p:nvPr/>
+        </p:nvSpPr>
+        <p:spPr>
+          <a:xfrm>
+            <a:off x="2909455" y="1828800"/>
+            <a:ext cx="4871258" cy="4438996"/>
+          </a:xfrm>
+          <a:prstGeom prst="rect">
+            <a:avLst/>
+          </a:prstGeom>
+          <a:solidFill>
+            <a:schemeClr val="tx1"/>
+          </a:solidFill>
+          <a:ln>
+            <a:noFill/>
+          </a:ln>
+        </p:spPr>
+        <p:style>
+          <a:lnRef idx="2">
+            <a:schemeClr val="accent1">
+              <a:shade val="50000"/>
+            </a:schemeClr>
+          </a:lnRef>
+          <a:fillRef idx="1">
+            <a:schemeClr val="accent1"/>
+          </a:fillRef>
+          <a:effectRef idx="0">
+            <a:schemeClr val="accent1"/>
+          </a:effectRef>
+          <a:fontRef idx="minor">
+            <a:schemeClr val="lt1"/>
+          </a:fontRef>
+        </p:style>
+        <p:txBody>
+          <a:bodyPr rtlCol="0" anchor="ctr"/>
+          <a:lstStyle/>
+          <a:p>
+            <a:pPr algn="ctr"/>
+            <a:endParaRPr lang="nl-NL"/>
+          </a:p>
+        </p:txBody>
+      </p:sp>
+      <p:cxnSp>
+        <p:nvCxnSpPr>
+          <p:cNvPr id="11" name="Straight Connector 10"/>
+          <p:cNvCxnSpPr/>
+          <p:nvPr/>
+        </p:nvCxnSpPr>
+        <p:spPr>
+          <a:xfrm>
+            <a:off x="3566160" y="2360814"/>
+            <a:ext cx="2219497" cy="0"/>
+          </a:xfrm>
+          <a:prstGeom prst="line">
+            <a:avLst/>
+          </a:prstGeom>
+          <a:ln>
+            <a:solidFill>
+              <a:schemeClr val="bg1"/>
+            </a:solidFill>
+          </a:ln>
+        </p:spPr>
+        <p:style>
+          <a:lnRef idx="1">
+            <a:schemeClr val="accent1"/>
+          </a:lnRef>
+          <a:fillRef idx="0">
+            <a:schemeClr val="accent1"/>
+          </a:fillRef>
+          <a:effectRef idx="0">
+            <a:schemeClr val="accent1"/>
+          </a:effectRef>
+          <a:fontRef idx="minor">
+            <a:schemeClr val="tx1"/>
+          </a:fontRef>
+        </p:style>
+      </p:cxnSp>
+      <p:cxnSp>
+        <p:nvCxnSpPr>
+          <p:cNvPr id="13" name="Straight Connector 12"/>
+          <p:cNvCxnSpPr/>
+          <p:nvPr/>
+        </p:nvCxnSpPr>
+        <p:spPr>
+          <a:xfrm>
+            <a:off x="5785657" y="2360814"/>
+            <a:ext cx="0" cy="2219498"/>
+          </a:xfrm>
+          <a:prstGeom prst="line">
+            <a:avLst/>
+          </a:prstGeom>
+          <a:ln>
+            <a:solidFill>
+              <a:schemeClr val="bg1"/>
+            </a:solidFill>
+          </a:ln>
+        </p:spPr>
+        <p:style>
+          <a:lnRef idx="1">
+            <a:schemeClr val="accent1"/>
+          </a:lnRef>
+          <a:fillRef idx="0">
+            <a:schemeClr val="accent1"/>
+          </a:fillRef>
+          <a:effectRef idx="0">
+            <a:schemeClr val="accent1"/>
+          </a:effectRef>
+          <a:fontRef idx="minor">
+            <a:schemeClr val="tx1"/>
+          </a:fontRef>
+        </p:style>
+      </p:cxnSp>
+      <p:cxnSp>
+        <p:nvCxnSpPr>
+          <p:cNvPr id="15" name="Straight Connector 14"/>
+          <p:cNvCxnSpPr/>
+          <p:nvPr/>
+        </p:nvCxnSpPr>
+        <p:spPr>
+          <a:xfrm>
+            <a:off x="5785657" y="4580312"/>
+            <a:ext cx="1221972" cy="0"/>
+          </a:xfrm>
+          <a:prstGeom prst="line">
+            <a:avLst/>
+          </a:prstGeom>
+          <a:ln>
+            <a:solidFill>
+              <a:schemeClr val="bg1"/>
+            </a:solidFill>
+          </a:ln>
+        </p:spPr>
+        <p:style>
+          <a:lnRef idx="1">
+            <a:schemeClr val="accent1"/>
+          </a:lnRef>
+          <a:fillRef idx="0">
+            <a:schemeClr val="accent1"/>
+          </a:fillRef>
+          <a:effectRef idx="0">
+            <a:schemeClr val="accent1"/>
+          </a:effectRef>
+          <a:fontRef idx="minor">
+            <a:schemeClr val="tx1"/>
+          </a:fontRef>
+        </p:style>
+      </p:cxnSp>
+      <p:cxnSp>
+        <p:nvCxnSpPr>
+          <p:cNvPr id="17" name="Straight Connector 16"/>
+          <p:cNvCxnSpPr/>
+          <p:nvPr/>
+        </p:nvCxnSpPr>
+        <p:spPr>
+          <a:xfrm>
+            <a:off x="7007629" y="4580312"/>
+            <a:ext cx="0" cy="1346663"/>
+          </a:xfrm>
+          <a:prstGeom prst="line">
+            <a:avLst/>
+          </a:prstGeom>
+          <a:ln>
+            <a:solidFill>
+              <a:schemeClr val="bg1"/>
+            </a:solidFill>
+          </a:ln>
+        </p:spPr>
+        <p:style>
+          <a:lnRef idx="1">
+            <a:schemeClr val="accent1"/>
+          </a:lnRef>
+          <a:fillRef idx="0">
+            <a:schemeClr val="accent1"/>
+          </a:fillRef>
+          <a:effectRef idx="0">
+            <a:schemeClr val="accent1"/>
+          </a:effectRef>
+          <a:fontRef idx="minor">
+            <a:schemeClr val="tx1"/>
+          </a:fontRef>
+        </p:style>
+      </p:cxnSp>
+      <p:cxnSp>
+        <p:nvCxnSpPr>
+          <p:cNvPr id="20" name="Straight Connector 19"/>
+          <p:cNvCxnSpPr/>
+          <p:nvPr/>
+        </p:nvCxnSpPr>
+        <p:spPr>
+          <a:xfrm>
+            <a:off x="3566160" y="2360814"/>
+            <a:ext cx="0" cy="2402379"/>
+          </a:xfrm>
+          <a:prstGeom prst="line">
+            <a:avLst/>
+          </a:prstGeom>
+          <a:ln>
+            <a:solidFill>
+              <a:schemeClr val="bg1"/>
+            </a:solidFill>
+          </a:ln>
+        </p:spPr>
+        <p:style>
+          <a:lnRef idx="1">
+            <a:schemeClr val="accent1"/>
+          </a:lnRef>
+          <a:fillRef idx="0">
+            <a:schemeClr val="accent1"/>
+          </a:fillRef>
+          <a:effectRef idx="0">
+            <a:schemeClr val="accent1"/>
+          </a:effectRef>
+          <a:fontRef idx="minor">
+            <a:schemeClr val="tx1"/>
+          </a:fontRef>
+        </p:style>
+      </p:cxnSp>
+      <p:cxnSp>
+        <p:nvCxnSpPr>
+          <p:cNvPr id="8" name="Straight Connector 7"/>
+          <p:cNvCxnSpPr/>
+          <p:nvPr/>
+        </p:nvCxnSpPr>
+        <p:spPr>
+          <a:xfrm>
+            <a:off x="5368212" y="4763193"/>
+            <a:ext cx="0" cy="1163782"/>
+          </a:xfrm>
+          <a:prstGeom prst="line">
+            <a:avLst/>
+          </a:prstGeom>
+          <a:ln>
+            <a:solidFill>
+              <a:schemeClr val="bg1"/>
+            </a:solidFill>
+          </a:ln>
+        </p:spPr>
+        <p:style>
+          <a:lnRef idx="1">
+            <a:schemeClr val="accent1"/>
+          </a:lnRef>
+          <a:fillRef idx="0">
+            <a:schemeClr val="accent1"/>
+          </a:fillRef>
+          <a:effectRef idx="0">
+            <a:schemeClr val="accent1"/>
+          </a:effectRef>
+          <a:fontRef idx="minor">
+            <a:schemeClr val="tx1"/>
+          </a:fontRef>
+        </p:style>
+      </p:cxnSp>
+      <p:cxnSp>
+        <p:nvCxnSpPr>
+          <p:cNvPr id="12" name="Straight Connector 11"/>
+          <p:cNvCxnSpPr/>
+          <p:nvPr/>
+        </p:nvCxnSpPr>
+        <p:spPr>
+          <a:xfrm>
+            <a:off x="5368212" y="5926975"/>
+            <a:ext cx="1639417" cy="0"/>
+          </a:xfrm>
+          <a:prstGeom prst="line">
+            <a:avLst/>
+          </a:prstGeom>
+          <a:ln>
+            <a:solidFill>
+              <a:schemeClr val="bg1"/>
+            </a:solidFill>
+          </a:ln>
+        </p:spPr>
+        <p:style>
+          <a:lnRef idx="1">
+            <a:schemeClr val="accent1"/>
+          </a:lnRef>
+          <a:fillRef idx="0">
+            <a:schemeClr val="accent1"/>
+          </a:fillRef>
+          <a:effectRef idx="0">
+            <a:schemeClr val="accent1"/>
+          </a:effectRef>
+          <a:fontRef idx="minor">
+            <a:schemeClr val="tx1"/>
+          </a:fontRef>
+        </p:style>
+      </p:cxnSp>
+      <p:cxnSp>
+        <p:nvCxnSpPr>
+          <p:cNvPr id="14" name="Straight Connector 13"/>
+          <p:cNvCxnSpPr/>
+          <p:nvPr/>
+        </p:nvCxnSpPr>
+        <p:spPr>
+          <a:xfrm>
+            <a:off x="3566160" y="4763193"/>
+            <a:ext cx="1802052" cy="0"/>
+          </a:xfrm>
+          <a:prstGeom prst="line">
+            <a:avLst/>
+          </a:prstGeom>
+          <a:ln>
+            <a:solidFill>
+              <a:schemeClr val="bg1"/>
+            </a:solidFill>
+          </a:ln>
+        </p:spPr>
+        <p:style>
+          <a:lnRef idx="1">
+            <a:schemeClr val="accent1"/>
+          </a:lnRef>
+          <a:fillRef idx="0">
+            <a:schemeClr val="accent1"/>
+          </a:fillRef>
+          <a:effectRef idx="0">
+            <a:schemeClr val="accent1"/>
+          </a:effectRef>
+          <a:fontRef idx="minor">
+            <a:schemeClr val="tx1"/>
+          </a:fontRef>
+        </p:style>
+      </p:cxnSp>
+      <p:cxnSp>
+        <p:nvCxnSpPr>
+          <p:cNvPr id="21" name="Straight Connector 20"/>
+          <p:cNvCxnSpPr/>
+          <p:nvPr/>
+        </p:nvCxnSpPr>
+        <p:spPr>
+          <a:xfrm>
+            <a:off x="5368212" y="2360814"/>
+            <a:ext cx="0" cy="2402379"/>
+          </a:xfrm>
+          <a:prstGeom prst="line">
+            <a:avLst/>
+          </a:prstGeom>
+          <a:ln>
+            <a:solidFill>
+              <a:schemeClr val="bg1"/>
+            </a:solidFill>
+          </a:ln>
+        </p:spPr>
+        <p:style>
+          <a:lnRef idx="1">
+            <a:schemeClr val="accent1"/>
+          </a:lnRef>
+          <a:fillRef idx="0">
+            <a:schemeClr val="accent1"/>
+          </a:fillRef>
+          <a:effectRef idx="0">
+            <a:schemeClr val="accent1"/>
+          </a:effectRef>
+          <a:fontRef idx="minor">
+            <a:schemeClr val="tx1"/>
+          </a:fontRef>
+        </p:style>
+      </p:cxnSp>
+    </p:spTree>
+    <p:extLst>
+      <p:ext uri="{BB962C8B-B14F-4D97-AF65-F5344CB8AC3E}">
+        <p14:creationId xmlns:p14="http://schemas.microsoft.com/office/powerpoint/2010/main" val="1985817931"/>
+      </p:ext>
+    </p:extLst>
+  </p:cSld>
+  <p:clrMapOvr>
+    <a:masterClrMapping/>
+  </p:clrMapOvr>
+</p:sld>
+</file>
+
+<file path=ppt/slides/slide3.xml><?xml version="1.0" encoding="utf-8"?>
+<p:sld xmlns:a="http://schemas.openxmlformats.org/drawingml/2006/main" xmlns:r="http://schemas.openxmlformats.org/officeDocument/2006/relationships" xmlns:p="http://schemas.openxmlformats.org/presentationml/2006/main">
+  <p:cSld>
+    <p:spTree>
+      <p:nvGrpSpPr>
+        <p:cNvPr id="1" name=""/>
+        <p:cNvGrpSpPr/>
+        <p:nvPr/>
+      </p:nvGrpSpPr>
+      <p:grpSpPr>
+        <a:xfrm>
+          <a:off x="0" y="0"/>
+          <a:ext cx="0" cy="0"/>
+          <a:chOff x="0" y="0"/>
+          <a:chExt cx="0" cy="0"/>
+        </a:xfrm>
+      </p:grpSpPr>
+      <p:sp>
+        <p:nvSpPr>
+          <p:cNvPr id="4" name="Rectangle 3"/>
+          <p:cNvSpPr/>
+          <p:nvPr/>
+        </p:nvSpPr>
+        <p:spPr>
+          <a:xfrm>
+            <a:off x="4153648" y="1763059"/>
+            <a:ext cx="4566023" cy="4350870"/>
+          </a:xfrm>
+          <a:prstGeom prst="rect">
+            <a:avLst/>
+          </a:prstGeom>
+          <a:solidFill>
+            <a:schemeClr val="tx1"/>
+          </a:solidFill>
+          <a:ln>
+            <a:noFill/>
+          </a:ln>
+        </p:spPr>
+        <p:style>
+          <a:lnRef idx="2">
+            <a:schemeClr val="accent1">
+              <a:shade val="50000"/>
+            </a:schemeClr>
+          </a:lnRef>
+          <a:fillRef idx="1">
+            <a:schemeClr val="accent1"/>
+          </a:fillRef>
+          <a:effectRef idx="0">
+            <a:schemeClr val="accent1"/>
+          </a:effectRef>
+          <a:fontRef idx="minor">
+            <a:schemeClr val="lt1"/>
+          </a:fontRef>
+        </p:style>
+        <p:txBody>
+          <a:bodyPr rtlCol="0" anchor="ctr"/>
+          <a:lstStyle/>
+          <a:p>
+            <a:pPr algn="ctr"/>
+            <a:endParaRPr lang="nl-NL"/>
+          </a:p>
+        </p:txBody>
+      </p:sp>
+      <p:sp>
+        <p:nvSpPr>
+          <p:cNvPr id="30" name="Rectangle 29"/>
+          <p:cNvSpPr/>
+          <p:nvPr/>
+        </p:nvSpPr>
+        <p:spPr>
+          <a:xfrm>
+            <a:off x="5504329" y="3155577"/>
+            <a:ext cx="1900518" cy="1583765"/>
+          </a:xfrm>
+          <a:prstGeom prst="rect">
+            <a:avLst/>
+          </a:prstGeom>
+          <a:noFill/>
+          <a:ln w="6350">
+            <a:solidFill>
+              <a:schemeClr val="bg1"/>
+            </a:solidFill>
+          </a:ln>
+        </p:spPr>
+        <p:style>
+          <a:lnRef idx="2">
+            <a:schemeClr val="accent1">
+              <a:shade val="50000"/>
+            </a:schemeClr>
+          </a:lnRef>
+          <a:fillRef idx="1">
+            <a:schemeClr val="accent1"/>
+          </a:fillRef>
+          <a:effectRef idx="0">
+            <a:schemeClr val="accent1"/>
+          </a:effectRef>
+          <a:fontRef idx="minor">
+            <a:schemeClr val="lt1"/>
+          </a:fontRef>
+        </p:style>
+        <p:txBody>
+          <a:bodyPr rtlCol="0" anchor="ctr"/>
+          <a:lstStyle/>
+          <a:p>
+            <a:pPr algn="ctr"/>
+            <a:endParaRPr lang="nl-NL"/>
+          </a:p>
+        </p:txBody>
+      </p:sp>
+      <p:sp>
+        <p:nvSpPr>
+          <p:cNvPr id="31" name="Rectangle 30"/>
+          <p:cNvSpPr/>
+          <p:nvPr/>
+        </p:nvSpPr>
+        <p:spPr>
+          <a:xfrm>
+            <a:off x="5068047" y="2695388"/>
+            <a:ext cx="2794000" cy="2501155"/>
+          </a:xfrm>
+          <a:prstGeom prst="rect">
+            <a:avLst/>
+          </a:prstGeom>
+          <a:noFill/>
+          <a:ln w="6350">
+            <a:solidFill>
+              <a:schemeClr val="bg1"/>
+            </a:solidFill>
+          </a:ln>
+        </p:spPr>
+        <p:style>
+          <a:lnRef idx="2">
+            <a:schemeClr val="accent1">
+              <a:shade val="50000"/>
+            </a:schemeClr>
+          </a:lnRef>
+          <a:fillRef idx="1">
+            <a:schemeClr val="accent1"/>
+          </a:fillRef>
+          <a:effectRef idx="0">
+            <a:schemeClr val="accent1"/>
+          </a:effectRef>
+          <a:fontRef idx="minor">
+            <a:schemeClr val="lt1"/>
+          </a:fontRef>
+        </p:style>
+        <p:txBody>
+          <a:bodyPr rtlCol="0" anchor="ctr"/>
+          <a:lstStyle/>
+          <a:p>
+            <a:pPr algn="ctr"/>
+            <a:endParaRPr lang="nl-NL"/>
+          </a:p>
+        </p:txBody>
+      </p:sp>
+      <p:sp>
+        <p:nvSpPr>
+          <p:cNvPr id="32" name="Rectangle 31"/>
+          <p:cNvSpPr/>
+          <p:nvPr/>
+        </p:nvSpPr>
+        <p:spPr>
+          <a:xfrm>
+            <a:off x="4601882" y="2217271"/>
+            <a:ext cx="3696447" cy="3439461"/>
+          </a:xfrm>
+          <a:prstGeom prst="rect">
+            <a:avLst/>
+          </a:prstGeom>
+          <a:noFill/>
+          <a:ln w="6350">
+            <a:solidFill>
+              <a:schemeClr val="bg1"/>
+            </a:solidFill>
+          </a:ln>
+        </p:spPr>
+        <p:style>
+          <a:lnRef idx="2">
+            <a:schemeClr val="accent1">
+              <a:shade val="50000"/>
+            </a:schemeClr>
+          </a:lnRef>
+          <a:fillRef idx="1">
+            <a:schemeClr val="accent1"/>
+          </a:fillRef>
+          <a:effectRef idx="0">
+            <a:schemeClr val="accent1"/>
+          </a:effectRef>
+          <a:fontRef idx="minor">
+            <a:schemeClr val="lt1"/>
+          </a:fontRef>
+        </p:style>
+        <p:txBody>
+          <a:bodyPr rtlCol="0" anchor="ctr"/>
+          <a:lstStyle/>
+          <a:p>
+            <a:pPr algn="ctr"/>
+            <a:endParaRPr lang="nl-NL"/>
+          </a:p>
+        </p:txBody>
+      </p:sp>
+      <p:cxnSp>
+        <p:nvCxnSpPr>
+          <p:cNvPr id="34" name="Straight Connector 33"/>
+          <p:cNvCxnSpPr/>
+          <p:nvPr/>
+        </p:nvCxnSpPr>
+        <p:spPr>
+          <a:xfrm>
+            <a:off x="6950636" y="2217271"/>
+            <a:ext cx="0" cy="478117"/>
+          </a:xfrm>
+          <a:prstGeom prst="line">
+            <a:avLst/>
+          </a:prstGeom>
+          <a:ln>
+            <a:solidFill>
+              <a:schemeClr val="bg1"/>
+            </a:solidFill>
+          </a:ln>
+        </p:spPr>
+        <p:style>
+          <a:lnRef idx="1">
+            <a:schemeClr val="accent1"/>
+          </a:lnRef>
+          <a:fillRef idx="0">
+            <a:schemeClr val="accent1"/>
+          </a:fillRef>
+          <a:effectRef idx="0">
+            <a:schemeClr val="accent1"/>
+          </a:effectRef>
+          <a:fontRef idx="minor">
+            <a:schemeClr val="tx1"/>
+          </a:fontRef>
+        </p:style>
+      </p:cxnSp>
+      <p:cxnSp>
+        <p:nvCxnSpPr>
+          <p:cNvPr id="35" name="Straight Connector 34"/>
+          <p:cNvCxnSpPr/>
+          <p:nvPr/>
+        </p:nvCxnSpPr>
+        <p:spPr>
+          <a:xfrm>
+            <a:off x="7168777" y="4739342"/>
+            <a:ext cx="8964" cy="457201"/>
+          </a:xfrm>
+          <a:prstGeom prst="line">
+            <a:avLst/>
+          </a:prstGeom>
+          <a:ln>
+            <a:solidFill>
+              <a:schemeClr val="bg1"/>
+            </a:solidFill>
+          </a:ln>
+        </p:spPr>
+        <p:style>
+          <a:lnRef idx="1">
+            <a:schemeClr val="accent1"/>
+          </a:lnRef>
+          <a:fillRef idx="0">
+            <a:schemeClr val="accent1"/>
+          </a:fillRef>
+          <a:effectRef idx="0">
+            <a:schemeClr val="accent1"/>
+          </a:effectRef>
+          <a:fontRef idx="minor">
+            <a:schemeClr val="tx1"/>
+          </a:fontRef>
+        </p:style>
+      </p:cxnSp>
+      <p:cxnSp>
+        <p:nvCxnSpPr>
+          <p:cNvPr id="39" name="Straight Connector 38"/>
+          <p:cNvCxnSpPr/>
+          <p:nvPr/>
+        </p:nvCxnSpPr>
+        <p:spPr>
+          <a:xfrm flipH="1">
+            <a:off x="7404847" y="3346827"/>
+            <a:ext cx="457201" cy="0"/>
+          </a:xfrm>
+          <a:prstGeom prst="line">
+            <a:avLst/>
+          </a:prstGeom>
+          <a:ln>
+            <a:solidFill>
+              <a:schemeClr val="bg1"/>
+            </a:solidFill>
+          </a:ln>
+        </p:spPr>
+        <p:style>
+          <a:lnRef idx="1">
+            <a:schemeClr val="accent1"/>
+          </a:lnRef>
+          <a:fillRef idx="0">
+            <a:schemeClr val="accent1"/>
+          </a:fillRef>
+          <a:effectRef idx="0">
+            <a:schemeClr val="accent1"/>
+          </a:effectRef>
+          <a:fontRef idx="minor">
+            <a:schemeClr val="tx1"/>
+          </a:fontRef>
+        </p:style>
+      </p:cxnSp>
+      <p:cxnSp>
+        <p:nvCxnSpPr>
+          <p:cNvPr id="42" name="Straight Connector 41"/>
+          <p:cNvCxnSpPr/>
+          <p:nvPr/>
+        </p:nvCxnSpPr>
+        <p:spPr>
+          <a:xfrm flipH="1">
+            <a:off x="4601882" y="2971800"/>
+            <a:ext cx="466166" cy="0"/>
+          </a:xfrm>
+          <a:prstGeom prst="line">
+            <a:avLst/>
+          </a:prstGeom>
+          <a:ln>
+            <a:solidFill>
+              <a:schemeClr val="bg1"/>
+            </a:solidFill>
+          </a:ln>
+        </p:spPr>
+        <p:style>
+          <a:lnRef idx="1">
+            <a:schemeClr val="accent1"/>
+          </a:lnRef>
+          <a:fillRef idx="0">
+            <a:schemeClr val="accent1"/>
+          </a:fillRef>
+          <a:effectRef idx="0">
+            <a:schemeClr val="accent1"/>
+          </a:effectRef>
+          <a:fontRef idx="minor">
+            <a:schemeClr val="tx1"/>
+          </a:fontRef>
+        </p:style>
+      </p:cxnSp>
+      <p:cxnSp>
+        <p:nvCxnSpPr>
+          <p:cNvPr id="44" name="Straight Connector 43"/>
+          <p:cNvCxnSpPr/>
+          <p:nvPr/>
+        </p:nvCxnSpPr>
+        <p:spPr>
+          <a:xfrm flipH="1">
+            <a:off x="5068047" y="4433048"/>
+            <a:ext cx="436282" cy="1493"/>
+          </a:xfrm>
+          <a:prstGeom prst="line">
+            <a:avLst/>
+          </a:prstGeom>
+          <a:ln>
+            <a:solidFill>
+              <a:schemeClr val="bg1"/>
+            </a:solidFill>
+          </a:ln>
+        </p:spPr>
+        <p:style>
+          <a:lnRef idx="1">
+            <a:schemeClr val="accent1"/>
+          </a:lnRef>
+          <a:fillRef idx="0">
+            <a:schemeClr val="accent1"/>
+          </a:fillRef>
+          <a:effectRef idx="0">
+            <a:schemeClr val="accent1"/>
+          </a:effectRef>
+          <a:fontRef idx="minor">
+            <a:schemeClr val="tx1"/>
+          </a:fontRef>
+        </p:style>
+      </p:cxnSp>
+      <p:cxnSp>
+        <p:nvCxnSpPr>
+          <p:cNvPr id="46" name="Straight Connector 45"/>
+          <p:cNvCxnSpPr/>
+          <p:nvPr/>
+        </p:nvCxnSpPr>
+        <p:spPr>
+          <a:xfrm flipH="1" flipV="1">
+            <a:off x="7862047" y="4566024"/>
+            <a:ext cx="436284" cy="2992"/>
+          </a:xfrm>
+          <a:prstGeom prst="line">
+            <a:avLst/>
+          </a:prstGeom>
+          <a:ln>
+            <a:solidFill>
+              <a:schemeClr val="bg1"/>
+            </a:solidFill>
+          </a:ln>
+        </p:spPr>
+        <p:style>
+          <a:lnRef idx="1">
+            <a:schemeClr val="accent1"/>
+          </a:lnRef>
+          <a:fillRef idx="0">
+            <a:schemeClr val="accent1"/>
+          </a:fillRef>
+          <a:effectRef idx="0">
+            <a:schemeClr val="accent1"/>
+          </a:effectRef>
+          <a:fontRef idx="minor">
+            <a:schemeClr val="tx1"/>
+          </a:fontRef>
+        </p:style>
+      </p:cxnSp>
+    </p:spTree>
+    <p:extLst>
+      <p:ext uri="{BB962C8B-B14F-4D97-AF65-F5344CB8AC3E}">
+        <p14:creationId xmlns:p14="http://schemas.microsoft.com/office/powerpoint/2010/main" val="2055217728"/>
+      </p:ext>
+    </p:extLst>
+  </p:cSld>
+  <p:clrMapOvr>
+    <a:masterClrMapping/>
+  </p:clrMapOvr>
+</p:sld>
+</file>
+
+<file path=ppt/slides/slide4.xml><?xml version="1.0" encoding="utf-8"?>
+<p:sld xmlns:a="http://schemas.openxmlformats.org/drawingml/2006/main" xmlns:r="http://schemas.openxmlformats.org/officeDocument/2006/relationships" xmlns:p="http://schemas.openxmlformats.org/presentationml/2006/main">
+  <p:cSld>
+    <p:spTree>
+      <p:nvGrpSpPr>
+        <p:cNvPr id="1" name=""/>
+        <p:cNvGrpSpPr/>
+        <p:nvPr/>
+      </p:nvGrpSpPr>
+      <p:grpSpPr>
+        <a:xfrm>
+          <a:off x="0" y="0"/>
+          <a:ext cx="0" cy="0"/>
+          <a:chOff x="0" y="0"/>
+          <a:chExt cx="0" cy="0"/>
+        </a:xfrm>
+      </p:grpSpPr>
+      <p:sp>
+        <p:nvSpPr>
+          <p:cNvPr id="4" name="Rectangle 3"/>
+          <p:cNvSpPr/>
+          <p:nvPr/>
+        </p:nvSpPr>
+        <p:spPr>
+          <a:xfrm>
+            <a:off x="2931758" y="1014761"/>
+            <a:ext cx="4871258" cy="4438996"/>
+          </a:xfrm>
+          <a:prstGeom prst="rect">
+            <a:avLst/>
+          </a:prstGeom>
+          <a:solidFill>
+            <a:schemeClr val="tx1"/>
+          </a:solidFill>
+          <a:ln>
+            <a:noFill/>
+          </a:ln>
+        </p:spPr>
+        <p:style>
+          <a:lnRef idx="2">
+            <a:schemeClr val="accent1">
+              <a:shade val="50000"/>
+            </a:schemeClr>
+          </a:lnRef>
+          <a:fillRef idx="1">
+            <a:schemeClr val="accent1"/>
+          </a:fillRef>
+          <a:effectRef idx="0">
+            <a:schemeClr val="accent1"/>
+          </a:effectRef>
+          <a:fontRef idx="minor">
+            <a:schemeClr val="lt1"/>
+          </a:fontRef>
+        </p:style>
+        <p:txBody>
+          <a:bodyPr rtlCol="0" anchor="ctr"/>
+          <a:lstStyle/>
+          <a:p>
+            <a:pPr algn="ctr"/>
+            <a:endParaRPr lang="nl-NL"/>
+          </a:p>
+        </p:txBody>
+      </p:sp>
+      <p:cxnSp>
+        <p:nvCxnSpPr>
+          <p:cNvPr id="13" name="Straight Connector 12"/>
+          <p:cNvCxnSpPr/>
+          <p:nvPr/>
+        </p:nvCxnSpPr>
+        <p:spPr>
+          <a:xfrm>
+            <a:off x="4222727" y="2044513"/>
+            <a:ext cx="2219497" cy="0"/>
+          </a:xfrm>
+          <a:prstGeom prst="line">
+            <a:avLst/>
+          </a:prstGeom>
+          <a:ln w="12700">
+            <a:solidFill>
+              <a:schemeClr val="bg1"/>
+            </a:solidFill>
+          </a:ln>
+        </p:spPr>
+        <p:style>
+          <a:lnRef idx="1">
+            <a:schemeClr val="accent1"/>
+          </a:lnRef>
+          <a:fillRef idx="0">
+            <a:schemeClr val="accent1"/>
+          </a:fillRef>
+          <a:effectRef idx="0">
+            <a:schemeClr val="accent1"/>
+          </a:effectRef>
+          <a:fontRef idx="minor">
+            <a:schemeClr val="tx1"/>
+          </a:fontRef>
+        </p:style>
+      </p:cxnSp>
+      <p:cxnSp>
+        <p:nvCxnSpPr>
+          <p:cNvPr id="14" name="Straight Connector 13"/>
+          <p:cNvCxnSpPr/>
+          <p:nvPr/>
+        </p:nvCxnSpPr>
+        <p:spPr>
+          <a:xfrm>
+            <a:off x="6442224" y="2044513"/>
+            <a:ext cx="0" cy="2402379"/>
+          </a:xfrm>
+          <a:prstGeom prst="line">
+            <a:avLst/>
+          </a:prstGeom>
+          <a:ln w="12700">
+            <a:solidFill>
+              <a:schemeClr val="bg1"/>
+            </a:solidFill>
+          </a:ln>
+        </p:spPr>
+        <p:style>
+          <a:lnRef idx="1">
+            <a:schemeClr val="accent1"/>
+          </a:lnRef>
+          <a:fillRef idx="0">
+            <a:schemeClr val="accent1"/>
+          </a:fillRef>
+          <a:effectRef idx="0">
+            <a:schemeClr val="accent1"/>
+          </a:effectRef>
+          <a:fontRef idx="minor">
+            <a:schemeClr val="tx1"/>
+          </a:fontRef>
+        </p:style>
+      </p:cxnSp>
+      <p:cxnSp>
+        <p:nvCxnSpPr>
+          <p:cNvPr id="15" name="Straight Connector 14"/>
+          <p:cNvCxnSpPr/>
+          <p:nvPr/>
+        </p:nvCxnSpPr>
+        <p:spPr>
+          <a:xfrm flipV="1">
+            <a:off x="4222727" y="4446895"/>
+            <a:ext cx="2219497" cy="2873"/>
+          </a:xfrm>
+          <a:prstGeom prst="line">
+            <a:avLst/>
+          </a:prstGeom>
+          <a:ln w="12700">
+            <a:solidFill>
+              <a:schemeClr val="bg1"/>
+            </a:solidFill>
+          </a:ln>
+        </p:spPr>
+        <p:style>
+          <a:lnRef idx="1">
+            <a:schemeClr val="accent1"/>
+          </a:lnRef>
+          <a:fillRef idx="0">
+            <a:schemeClr val="accent1"/>
+          </a:fillRef>
+          <a:effectRef idx="0">
+            <a:schemeClr val="accent1"/>
+          </a:effectRef>
+          <a:fontRef idx="minor">
+            <a:schemeClr val="tx1"/>
+          </a:fontRef>
+        </p:style>
+      </p:cxnSp>
+      <p:cxnSp>
+        <p:nvCxnSpPr>
+          <p:cNvPr id="16" name="Straight Connector 15"/>
+          <p:cNvCxnSpPr/>
+          <p:nvPr/>
+        </p:nvCxnSpPr>
+        <p:spPr>
+          <a:xfrm>
+            <a:off x="5880444" y="1595886"/>
+            <a:ext cx="2771" cy="448627"/>
+          </a:xfrm>
+          <a:prstGeom prst="line">
+            <a:avLst/>
+          </a:prstGeom>
+          <a:ln w="12700">
+            <a:solidFill>
+              <a:schemeClr val="bg1"/>
+            </a:solidFill>
+          </a:ln>
+        </p:spPr>
+        <p:style>
+          <a:lnRef idx="1">
+            <a:schemeClr val="accent1"/>
+          </a:lnRef>
+          <a:fillRef idx="0">
+            <a:schemeClr val="accent1"/>
+          </a:fillRef>
+          <a:effectRef idx="0">
+            <a:schemeClr val="accent1"/>
+          </a:effectRef>
+          <a:fontRef idx="minor">
+            <a:schemeClr val="tx1"/>
+          </a:fontRef>
+        </p:style>
+      </p:cxnSp>
+      <p:cxnSp>
+        <p:nvCxnSpPr>
+          <p:cNvPr id="17" name="Straight Connector 16"/>
+          <p:cNvCxnSpPr/>
+          <p:nvPr/>
+        </p:nvCxnSpPr>
+        <p:spPr>
+          <a:xfrm>
+            <a:off x="4222727" y="2044513"/>
+            <a:ext cx="0" cy="2402379"/>
+          </a:xfrm>
+          <a:prstGeom prst="line">
+            <a:avLst/>
+          </a:prstGeom>
+          <a:ln w="12700">
+            <a:solidFill>
+              <a:schemeClr val="bg1"/>
+            </a:solidFill>
+          </a:ln>
+        </p:spPr>
+        <p:style>
+          <a:lnRef idx="1">
+            <a:schemeClr val="accent1"/>
+          </a:lnRef>
+          <a:fillRef idx="0">
+            <a:schemeClr val="accent1"/>
+          </a:fillRef>
+          <a:effectRef idx="0">
+            <a:schemeClr val="accent1"/>
+          </a:effectRef>
+          <a:fontRef idx="minor">
+            <a:schemeClr val="tx1"/>
+          </a:fontRef>
+        </p:style>
+      </p:cxnSp>
+      <p:cxnSp>
+        <p:nvCxnSpPr>
+          <p:cNvPr id="20" name="Straight Connector 19"/>
+          <p:cNvCxnSpPr/>
+          <p:nvPr/>
+        </p:nvCxnSpPr>
+        <p:spPr>
+          <a:xfrm>
+            <a:off x="3754025" y="1595886"/>
+            <a:ext cx="3133897" cy="2876"/>
+          </a:xfrm>
+          <a:prstGeom prst="line">
+            <a:avLst/>
+          </a:prstGeom>
+          <a:ln w="12700">
+            <a:solidFill>
+              <a:schemeClr val="bg1"/>
+            </a:solidFill>
+          </a:ln>
+        </p:spPr>
+        <p:style>
+          <a:lnRef idx="1">
+            <a:schemeClr val="accent1"/>
+          </a:lnRef>
+          <a:fillRef idx="0">
+            <a:schemeClr val="accent1"/>
+          </a:fillRef>
+          <a:effectRef idx="0">
+            <a:schemeClr val="accent1"/>
+          </a:effectRef>
+          <a:fontRef idx="minor">
+            <a:schemeClr val="tx1"/>
+          </a:fontRef>
+        </p:style>
+      </p:cxnSp>
+      <p:cxnSp>
+        <p:nvCxnSpPr>
+          <p:cNvPr id="21" name="Straight Connector 20"/>
+          <p:cNvCxnSpPr/>
+          <p:nvPr/>
+        </p:nvCxnSpPr>
+        <p:spPr>
+          <a:xfrm>
+            <a:off x="6887922" y="1598762"/>
+            <a:ext cx="0" cy="3265073"/>
+          </a:xfrm>
+          <a:prstGeom prst="line">
+            <a:avLst/>
+          </a:prstGeom>
+          <a:ln w="12700">
+            <a:solidFill>
+              <a:schemeClr val="bg1"/>
+            </a:solidFill>
+          </a:ln>
+        </p:spPr>
+        <p:style>
+          <a:lnRef idx="1">
+            <a:schemeClr val="accent1"/>
+          </a:lnRef>
+          <a:fillRef idx="0">
+            <a:schemeClr val="accent1"/>
+          </a:fillRef>
+          <a:effectRef idx="0">
+            <a:schemeClr val="accent1"/>
+          </a:effectRef>
+          <a:fontRef idx="minor">
+            <a:schemeClr val="tx1"/>
+          </a:fontRef>
+        </p:style>
+      </p:cxnSp>
+      <p:cxnSp>
+        <p:nvCxnSpPr>
+          <p:cNvPr id="22" name="Straight Connector 21"/>
+          <p:cNvCxnSpPr/>
+          <p:nvPr/>
+        </p:nvCxnSpPr>
+        <p:spPr>
+          <a:xfrm>
+            <a:off x="3754025" y="4866711"/>
+            <a:ext cx="3133897" cy="1"/>
+          </a:xfrm>
+          <a:prstGeom prst="line">
+            <a:avLst/>
+          </a:prstGeom>
+          <a:ln w="12700">
+            <a:solidFill>
+              <a:schemeClr val="bg1"/>
+            </a:solidFill>
+          </a:ln>
+        </p:spPr>
+        <p:style>
+          <a:lnRef idx="1">
+            <a:schemeClr val="accent1"/>
+          </a:lnRef>
+          <a:fillRef idx="0">
+            <a:schemeClr val="accent1"/>
+          </a:fillRef>
+          <a:effectRef idx="0">
+            <a:schemeClr val="accent1"/>
+          </a:effectRef>
+          <a:fontRef idx="minor">
+            <a:schemeClr val="tx1"/>
+          </a:fontRef>
+        </p:style>
+      </p:cxnSp>
+      <p:cxnSp>
+        <p:nvCxnSpPr>
+          <p:cNvPr id="23" name="Straight Connector 22"/>
+          <p:cNvCxnSpPr/>
+          <p:nvPr/>
+        </p:nvCxnSpPr>
+        <p:spPr>
+          <a:xfrm>
+            <a:off x="3754025" y="1598762"/>
+            <a:ext cx="0" cy="3270824"/>
+          </a:xfrm>
+          <a:prstGeom prst="line">
+            <a:avLst/>
+          </a:prstGeom>
+          <a:ln w="12700">
+            <a:solidFill>
+              <a:schemeClr val="bg1"/>
+            </a:solidFill>
+          </a:ln>
+        </p:spPr>
+        <p:style>
+          <a:lnRef idx="1">
+            <a:schemeClr val="accent1"/>
+          </a:lnRef>
+          <a:fillRef idx="0">
+            <a:schemeClr val="accent1"/>
+          </a:fillRef>
+          <a:effectRef idx="0">
+            <a:schemeClr val="accent1"/>
+          </a:effectRef>
+          <a:fontRef idx="minor">
+            <a:schemeClr val="tx1"/>
+          </a:fontRef>
+        </p:style>
+      </p:cxnSp>
+      <p:cxnSp>
+        <p:nvCxnSpPr>
+          <p:cNvPr id="38" name="Straight Connector 37"/>
+          <p:cNvCxnSpPr/>
+          <p:nvPr/>
+        </p:nvCxnSpPr>
+        <p:spPr>
+          <a:xfrm>
+            <a:off x="4619625" y="4446892"/>
+            <a:ext cx="1257" cy="424132"/>
+          </a:xfrm>
+          <a:prstGeom prst="line">
+            <a:avLst/>
+          </a:prstGeom>
+          <a:ln w="12700">
+            <a:solidFill>
+              <a:schemeClr val="bg1"/>
+            </a:solidFill>
+          </a:ln>
+        </p:spPr>
+        <p:style>
+          <a:lnRef idx="1">
+            <a:schemeClr val="accent1"/>
+          </a:lnRef>
+          <a:fillRef idx="0">
+            <a:schemeClr val="accent1"/>
+          </a:fillRef>
+          <a:effectRef idx="0">
+            <a:schemeClr val="accent1"/>
+          </a:effectRef>
+          <a:fontRef idx="minor">
+            <a:schemeClr val="tx1"/>
+          </a:fontRef>
+        </p:style>
+      </p:cxnSp>
+    </p:spTree>
+    <p:extLst>
+      <p:ext uri="{BB962C8B-B14F-4D97-AF65-F5344CB8AC3E}">
+        <p14:creationId xmlns:p14="http://schemas.microsoft.com/office/powerpoint/2010/main" val="4095599319"/>
+      </p:ext>
+    </p:extLst>
+  </p:cSld>
+  <p:clrMapOvr>
+    <a:masterClrMapping/>
+  </p:clrMapOvr>
+</p:sld>
+</file>
+
 <file path=ppt/theme/theme1.xml><?xml version="1.0" encoding="utf-8"?>
 <a:theme xmlns:a="http://schemas.openxmlformats.org/drawingml/2006/main" name="Office Theme">
   <a:themeElements>

</xml_diff>

<commit_message>
Finalized delivery program - only Track Program is the main now
</commit_message>
<xml_diff>
--- a/sample_maps.pptx
+++ b/sample_maps.pptx
@@ -5,10 +5,11 @@
     <p:sldMasterId id="2147483648" r:id="rId1"/>
   </p:sldMasterIdLst>
   <p:sldIdLst>
-    <p:sldId id="256" r:id="rId2"/>
-    <p:sldId id="257" r:id="rId3"/>
-    <p:sldId id="258" r:id="rId4"/>
-    <p:sldId id="259" r:id="rId5"/>
+    <p:sldId id="257" r:id="rId2"/>
+    <p:sldId id="258" r:id="rId3"/>
+    <p:sldId id="259" r:id="rId4"/>
+    <p:sldId id="260" r:id="rId5"/>
+    <p:sldId id="261" r:id="rId6"/>
   </p:sldIdLst>
   <p:sldSz cx="12192000" cy="6858000"/>
   <p:notesSz cx="6858000" cy="9144000"/>
@@ -246,7 +247,7 @@
           <a:p>
             <a:fld id="{1F35354B-CEDA-4122-BD5C-84A48085FB12}" type="datetimeFigureOut">
               <a:rPr lang="nl-NL" smtClean="0"/>
-              <a:t>24-10-2020</a:t>
+              <a:t>26-10-2020</a:t>
             </a:fld>
             <a:endParaRPr lang="nl-NL"/>
           </a:p>
@@ -416,7 +417,7 @@
           <a:p>
             <a:fld id="{1F35354B-CEDA-4122-BD5C-84A48085FB12}" type="datetimeFigureOut">
               <a:rPr lang="nl-NL" smtClean="0"/>
-              <a:t>24-10-2020</a:t>
+              <a:t>26-10-2020</a:t>
             </a:fld>
             <a:endParaRPr lang="nl-NL"/>
           </a:p>
@@ -596,7 +597,7 @@
           <a:p>
             <a:fld id="{1F35354B-CEDA-4122-BD5C-84A48085FB12}" type="datetimeFigureOut">
               <a:rPr lang="nl-NL" smtClean="0"/>
-              <a:t>24-10-2020</a:t>
+              <a:t>26-10-2020</a:t>
             </a:fld>
             <a:endParaRPr lang="nl-NL"/>
           </a:p>
@@ -766,7 +767,7 @@
           <a:p>
             <a:fld id="{1F35354B-CEDA-4122-BD5C-84A48085FB12}" type="datetimeFigureOut">
               <a:rPr lang="nl-NL" smtClean="0"/>
-              <a:t>24-10-2020</a:t>
+              <a:t>26-10-2020</a:t>
             </a:fld>
             <a:endParaRPr lang="nl-NL"/>
           </a:p>
@@ -1012,7 +1013,7 @@
           <a:p>
             <a:fld id="{1F35354B-CEDA-4122-BD5C-84A48085FB12}" type="datetimeFigureOut">
               <a:rPr lang="nl-NL" smtClean="0"/>
-              <a:t>24-10-2020</a:t>
+              <a:t>26-10-2020</a:t>
             </a:fld>
             <a:endParaRPr lang="nl-NL"/>
           </a:p>
@@ -1244,7 +1245,7 @@
           <a:p>
             <a:fld id="{1F35354B-CEDA-4122-BD5C-84A48085FB12}" type="datetimeFigureOut">
               <a:rPr lang="nl-NL" smtClean="0"/>
-              <a:t>24-10-2020</a:t>
+              <a:t>26-10-2020</a:t>
             </a:fld>
             <a:endParaRPr lang="nl-NL"/>
           </a:p>
@@ -1611,7 +1612,7 @@
           <a:p>
             <a:fld id="{1F35354B-CEDA-4122-BD5C-84A48085FB12}" type="datetimeFigureOut">
               <a:rPr lang="nl-NL" smtClean="0"/>
-              <a:t>24-10-2020</a:t>
+              <a:t>26-10-2020</a:t>
             </a:fld>
             <a:endParaRPr lang="nl-NL"/>
           </a:p>
@@ -1729,7 +1730,7 @@
           <a:p>
             <a:fld id="{1F35354B-CEDA-4122-BD5C-84A48085FB12}" type="datetimeFigureOut">
               <a:rPr lang="nl-NL" smtClean="0"/>
-              <a:t>24-10-2020</a:t>
+              <a:t>26-10-2020</a:t>
             </a:fld>
             <a:endParaRPr lang="nl-NL"/>
           </a:p>
@@ -1824,7 +1825,7 @@
           <a:p>
             <a:fld id="{1F35354B-CEDA-4122-BD5C-84A48085FB12}" type="datetimeFigureOut">
               <a:rPr lang="nl-NL" smtClean="0"/>
-              <a:t>24-10-2020</a:t>
+              <a:t>26-10-2020</a:t>
             </a:fld>
             <a:endParaRPr lang="nl-NL"/>
           </a:p>
@@ -2101,7 +2102,7 @@
           <a:p>
             <a:fld id="{1F35354B-CEDA-4122-BD5C-84A48085FB12}" type="datetimeFigureOut">
               <a:rPr lang="nl-NL" smtClean="0"/>
-              <a:t>24-10-2020</a:t>
+              <a:t>26-10-2020</a:t>
             </a:fld>
             <a:endParaRPr lang="nl-NL"/>
           </a:p>
@@ -2354,7 +2355,7 @@
           <a:p>
             <a:fld id="{1F35354B-CEDA-4122-BD5C-84A48085FB12}" type="datetimeFigureOut">
               <a:rPr lang="nl-NL" smtClean="0"/>
-              <a:t>24-10-2020</a:t>
+              <a:t>26-10-2020</a:t>
             </a:fld>
             <a:endParaRPr lang="nl-NL"/>
           </a:p>
@@ -2567,7 +2568,7 @@
           <a:p>
             <a:fld id="{1F35354B-CEDA-4122-BD5C-84A48085FB12}" type="datetimeFigureOut">
               <a:rPr lang="nl-NL" smtClean="0"/>
-              <a:t>24-10-2020</a:t>
+              <a:t>26-10-2020</a:t>
             </a:fld>
             <a:endParaRPr lang="nl-NL"/>
           </a:p>
@@ -2980,8 +2981,8 @@
         </p:nvSpPr>
         <p:spPr>
           <a:xfrm>
-            <a:off x="2909455" y="1828800"/>
-            <a:ext cx="4871258" cy="4438996"/>
+            <a:off x="2176030" y="295275"/>
+            <a:ext cx="4843895" cy="4933950"/>
           </a:xfrm>
           <a:prstGeom prst="rect">
             <a:avLst/>
@@ -3018,23 +3019,20 @@
           </a:p>
         </p:txBody>
       </p:sp>
-      <p:sp>
-        <p:nvSpPr>
-          <p:cNvPr id="5" name="Rectangle 4"/>
-          <p:cNvSpPr/>
+      <p:cxnSp>
+        <p:nvCxnSpPr>
+          <p:cNvPr id="11" name="Straight Connector 10"/>
+          <p:cNvCxnSpPr/>
           <p:nvPr/>
-        </p:nvSpPr>
-        <p:spPr>
-          <a:xfrm>
-            <a:off x="3566160" y="2360815"/>
-            <a:ext cx="232756" cy="1986741"/>
-          </a:xfrm>
-          <a:prstGeom prst="rect">
+        </p:nvCxnSpPr>
+        <p:spPr>
+          <a:xfrm>
+            <a:off x="2423160" y="620120"/>
+            <a:ext cx="2219497" cy="0"/>
+          </a:xfrm>
+          <a:prstGeom prst="line">
             <a:avLst/>
           </a:prstGeom>
-          <a:solidFill>
-            <a:schemeClr val="bg1"/>
-          </a:solidFill>
           <a:ln>
             <a:solidFill>
               <a:schemeClr val="bg1"/>
@@ -3042,47 +3040,34 @@
           </a:ln>
         </p:spPr>
         <p:style>
-          <a:lnRef idx="2">
-            <a:schemeClr val="accent1">
-              <a:shade val="50000"/>
-            </a:schemeClr>
+          <a:lnRef idx="1">
+            <a:schemeClr val="accent1"/>
           </a:lnRef>
-          <a:fillRef idx="1">
+          <a:fillRef idx="0">
             <a:schemeClr val="accent1"/>
           </a:fillRef>
           <a:effectRef idx="0">
             <a:schemeClr val="accent1"/>
           </a:effectRef>
           <a:fontRef idx="minor">
-            <a:schemeClr val="lt1"/>
+            <a:schemeClr val="tx1"/>
           </a:fontRef>
         </p:style>
-        <p:txBody>
-          <a:bodyPr rtlCol="0" anchor="ctr"/>
-          <a:lstStyle/>
-          <a:p>
-            <a:pPr algn="ctr"/>
-            <a:endParaRPr lang="nl-NL"/>
-          </a:p>
-        </p:txBody>
-      </p:sp>
-      <p:sp>
-        <p:nvSpPr>
-          <p:cNvPr id="6" name="Rectangle 5"/>
-          <p:cNvSpPr/>
+      </p:cxnSp>
+      <p:cxnSp>
+        <p:nvCxnSpPr>
+          <p:cNvPr id="13" name="Straight Connector 12"/>
+          <p:cNvCxnSpPr/>
           <p:nvPr/>
-        </p:nvSpPr>
-        <p:spPr>
-          <a:xfrm rot="5400000">
-            <a:off x="4675908" y="1483822"/>
-            <a:ext cx="232756" cy="1986741"/>
-          </a:xfrm>
-          <a:prstGeom prst="rect">
+        </p:nvCxnSpPr>
+        <p:spPr>
+          <a:xfrm>
+            <a:off x="4642657" y="617739"/>
+            <a:ext cx="0" cy="2402379"/>
+          </a:xfrm>
+          <a:prstGeom prst="line">
             <a:avLst/>
           </a:prstGeom>
-          <a:solidFill>
-            <a:schemeClr val="bg1"/>
-          </a:solidFill>
           <a:ln>
             <a:solidFill>
               <a:schemeClr val="bg1"/>
@@ -3090,47 +3075,34 @@
           </a:ln>
         </p:spPr>
         <p:style>
-          <a:lnRef idx="2">
-            <a:schemeClr val="accent1">
-              <a:shade val="50000"/>
-            </a:schemeClr>
+          <a:lnRef idx="1">
+            <a:schemeClr val="accent1"/>
           </a:lnRef>
-          <a:fillRef idx="1">
+          <a:fillRef idx="0">
             <a:schemeClr val="accent1"/>
           </a:fillRef>
           <a:effectRef idx="0">
             <a:schemeClr val="accent1"/>
           </a:effectRef>
           <a:fontRef idx="minor">
-            <a:schemeClr val="lt1"/>
+            <a:schemeClr val="tx1"/>
           </a:fontRef>
         </p:style>
-        <p:txBody>
-          <a:bodyPr rtlCol="0" anchor="ctr"/>
-          <a:lstStyle/>
-          <a:p>
-            <a:pPr algn="ctr"/>
-            <a:endParaRPr lang="nl-NL"/>
-          </a:p>
-        </p:txBody>
-      </p:sp>
-      <p:sp>
-        <p:nvSpPr>
-          <p:cNvPr id="7" name="Rectangle 6"/>
-          <p:cNvSpPr/>
+      </p:cxnSp>
+      <p:cxnSp>
+        <p:nvCxnSpPr>
+          <p:cNvPr id="15" name="Straight Connector 14"/>
+          <p:cNvCxnSpPr/>
           <p:nvPr/>
-        </p:nvSpPr>
-        <p:spPr>
-          <a:xfrm rot="10800000">
-            <a:off x="5552902" y="2593571"/>
-            <a:ext cx="232756" cy="1986741"/>
-          </a:xfrm>
-          <a:prstGeom prst="rect">
+        </p:nvCxnSpPr>
+        <p:spPr>
+          <a:xfrm>
+            <a:off x="5120562" y="3487318"/>
+            <a:ext cx="1639417" cy="0"/>
+          </a:xfrm>
+          <a:prstGeom prst="line">
             <a:avLst/>
           </a:prstGeom>
-          <a:solidFill>
-            <a:schemeClr val="bg1"/>
-          </a:solidFill>
           <a:ln>
             <a:solidFill>
               <a:schemeClr val="bg1"/>
@@ -3138,47 +3110,34 @@
           </a:ln>
         </p:spPr>
         <p:style>
-          <a:lnRef idx="2">
-            <a:schemeClr val="accent1">
-              <a:shade val="50000"/>
-            </a:schemeClr>
+          <a:lnRef idx="1">
+            <a:schemeClr val="accent1"/>
           </a:lnRef>
-          <a:fillRef idx="1">
+          <a:fillRef idx="0">
             <a:schemeClr val="accent1"/>
           </a:fillRef>
           <a:effectRef idx="0">
             <a:schemeClr val="accent1"/>
           </a:effectRef>
           <a:fontRef idx="minor">
-            <a:schemeClr val="lt1"/>
+            <a:schemeClr val="tx1"/>
           </a:fontRef>
         </p:style>
-        <p:txBody>
-          <a:bodyPr rtlCol="0" anchor="ctr"/>
-          <a:lstStyle/>
-          <a:p>
-            <a:pPr algn="ctr"/>
-            <a:endParaRPr lang="nl-NL"/>
-          </a:p>
-        </p:txBody>
-      </p:sp>
-      <p:sp>
-        <p:nvSpPr>
-          <p:cNvPr id="8" name="Rectangle 7"/>
-          <p:cNvSpPr/>
+      </p:cxnSp>
+      <p:cxnSp>
+        <p:nvCxnSpPr>
+          <p:cNvPr id="17" name="Straight Connector 16"/>
+          <p:cNvCxnSpPr/>
           <p:nvPr/>
-        </p:nvSpPr>
-        <p:spPr>
-          <a:xfrm rot="16200000">
-            <a:off x="5838307" y="3703320"/>
-            <a:ext cx="232756" cy="1986741"/>
-          </a:xfrm>
-          <a:prstGeom prst="rect">
+        </p:nvCxnSpPr>
+        <p:spPr>
+          <a:xfrm>
+            <a:off x="6759979" y="3484937"/>
+            <a:ext cx="0" cy="1346663"/>
+          </a:xfrm>
+          <a:prstGeom prst="line">
             <a:avLst/>
           </a:prstGeom>
-          <a:solidFill>
-            <a:schemeClr val="bg1"/>
-          </a:solidFill>
           <a:ln>
             <a:solidFill>
               <a:schemeClr val="bg1"/>
@@ -3186,47 +3145,34 @@
           </a:ln>
         </p:spPr>
         <p:style>
-          <a:lnRef idx="2">
-            <a:schemeClr val="accent1">
-              <a:shade val="50000"/>
-            </a:schemeClr>
+          <a:lnRef idx="1">
+            <a:schemeClr val="accent1"/>
           </a:lnRef>
-          <a:fillRef idx="1">
+          <a:fillRef idx="0">
             <a:schemeClr val="accent1"/>
           </a:fillRef>
           <a:effectRef idx="0">
             <a:schemeClr val="accent1"/>
           </a:effectRef>
           <a:fontRef idx="minor">
-            <a:schemeClr val="lt1"/>
+            <a:schemeClr val="tx1"/>
           </a:fontRef>
         </p:style>
-        <p:txBody>
-          <a:bodyPr rtlCol="0" anchor="ctr"/>
-          <a:lstStyle/>
-          <a:p>
-            <a:pPr algn="ctr"/>
-            <a:endParaRPr lang="nl-NL"/>
-          </a:p>
-        </p:txBody>
-      </p:sp>
-      <p:sp>
-        <p:nvSpPr>
-          <p:cNvPr id="9" name="Rectangle 8"/>
-          <p:cNvSpPr/>
+      </p:cxnSp>
+      <p:cxnSp>
+        <p:nvCxnSpPr>
+          <p:cNvPr id="20" name="Straight Connector 19"/>
+          <p:cNvCxnSpPr/>
           <p:nvPr/>
-        </p:nvSpPr>
-        <p:spPr>
-          <a:xfrm rot="10800000">
-            <a:off x="6886403" y="3819698"/>
-            <a:ext cx="232756" cy="1986741"/>
-          </a:xfrm>
-          <a:prstGeom prst="rect">
+        </p:nvCxnSpPr>
+        <p:spPr>
+          <a:xfrm>
+            <a:off x="2423160" y="617739"/>
+            <a:ext cx="0" cy="2402379"/>
+          </a:xfrm>
+          <a:prstGeom prst="line">
             <a:avLst/>
           </a:prstGeom>
-          <a:solidFill>
-            <a:schemeClr val="bg1"/>
-          </a:solidFill>
           <a:ln>
             <a:solidFill>
               <a:schemeClr val="bg1"/>
@@ -3234,34 +3180,234 @@
           </a:ln>
         </p:spPr>
         <p:style>
-          <a:lnRef idx="2">
-            <a:schemeClr val="accent1">
-              <a:shade val="50000"/>
-            </a:schemeClr>
+          <a:lnRef idx="1">
+            <a:schemeClr val="accent1"/>
           </a:lnRef>
-          <a:fillRef idx="1">
+          <a:fillRef idx="0">
             <a:schemeClr val="accent1"/>
           </a:fillRef>
           <a:effectRef idx="0">
             <a:schemeClr val="accent1"/>
           </a:effectRef>
           <a:fontRef idx="minor">
-            <a:schemeClr val="lt1"/>
+            <a:schemeClr val="tx1"/>
           </a:fontRef>
         </p:style>
-        <p:txBody>
-          <a:bodyPr rtlCol="0" anchor="ctr"/>
-          <a:lstStyle/>
-          <a:p>
-            <a:pPr algn="ctr"/>
-            <a:endParaRPr lang="nl-NL"/>
-          </a:p>
-        </p:txBody>
-      </p:sp>
+      </p:cxnSp>
+      <p:cxnSp>
+        <p:nvCxnSpPr>
+          <p:cNvPr id="8" name="Straight Connector 7"/>
+          <p:cNvCxnSpPr/>
+          <p:nvPr/>
+        </p:nvCxnSpPr>
+        <p:spPr>
+          <a:xfrm>
+            <a:off x="5120562" y="3484937"/>
+            <a:ext cx="0" cy="1346663"/>
+          </a:xfrm>
+          <a:prstGeom prst="line">
+            <a:avLst/>
+          </a:prstGeom>
+          <a:ln>
+            <a:solidFill>
+              <a:schemeClr val="bg1"/>
+            </a:solidFill>
+          </a:ln>
+        </p:spPr>
+        <p:style>
+          <a:lnRef idx="1">
+            <a:schemeClr val="accent1"/>
+          </a:lnRef>
+          <a:fillRef idx="0">
+            <a:schemeClr val="accent1"/>
+          </a:fillRef>
+          <a:effectRef idx="0">
+            <a:schemeClr val="accent1"/>
+          </a:effectRef>
+          <a:fontRef idx="minor">
+            <a:schemeClr val="tx1"/>
+          </a:fontRef>
+        </p:style>
+      </p:cxnSp>
+      <p:cxnSp>
+        <p:nvCxnSpPr>
+          <p:cNvPr id="12" name="Straight Connector 11"/>
+          <p:cNvCxnSpPr/>
+          <p:nvPr/>
+        </p:nvCxnSpPr>
+        <p:spPr>
+          <a:xfrm>
+            <a:off x="5120562" y="4826838"/>
+            <a:ext cx="1639417" cy="0"/>
+          </a:xfrm>
+          <a:prstGeom prst="line">
+            <a:avLst/>
+          </a:prstGeom>
+          <a:ln>
+            <a:solidFill>
+              <a:schemeClr val="bg1"/>
+            </a:solidFill>
+          </a:ln>
+        </p:spPr>
+        <p:style>
+          <a:lnRef idx="1">
+            <a:schemeClr val="accent1"/>
+          </a:lnRef>
+          <a:fillRef idx="0">
+            <a:schemeClr val="accent1"/>
+          </a:fillRef>
+          <a:effectRef idx="0">
+            <a:schemeClr val="accent1"/>
+          </a:effectRef>
+          <a:fontRef idx="minor">
+            <a:schemeClr val="tx1"/>
+          </a:fontRef>
+        </p:style>
+      </p:cxnSp>
+      <p:cxnSp>
+        <p:nvCxnSpPr>
+          <p:cNvPr id="14" name="Straight Connector 13"/>
+          <p:cNvCxnSpPr/>
+          <p:nvPr/>
+        </p:nvCxnSpPr>
+        <p:spPr>
+          <a:xfrm>
+            <a:off x="2423160" y="3020118"/>
+            <a:ext cx="2219497" cy="0"/>
+          </a:xfrm>
+          <a:prstGeom prst="line">
+            <a:avLst/>
+          </a:prstGeom>
+          <a:ln>
+            <a:solidFill>
+              <a:schemeClr val="bg1"/>
+            </a:solidFill>
+          </a:ln>
+        </p:spPr>
+        <p:style>
+          <a:lnRef idx="1">
+            <a:schemeClr val="accent1"/>
+          </a:lnRef>
+          <a:fillRef idx="0">
+            <a:schemeClr val="accent1"/>
+          </a:fillRef>
+          <a:effectRef idx="0">
+            <a:schemeClr val="accent1"/>
+          </a:effectRef>
+          <a:fontRef idx="minor">
+            <a:schemeClr val="tx1"/>
+          </a:fontRef>
+        </p:style>
+      </p:cxnSp>
+      <p:cxnSp>
+        <p:nvCxnSpPr>
+          <p:cNvPr id="16" name="Straight Connector 15"/>
+          <p:cNvCxnSpPr/>
+          <p:nvPr/>
+        </p:nvCxnSpPr>
+        <p:spPr>
+          <a:xfrm>
+            <a:off x="4829269" y="3486194"/>
+            <a:ext cx="288000" cy="0"/>
+          </a:xfrm>
+          <a:prstGeom prst="line">
+            <a:avLst/>
+          </a:prstGeom>
+          <a:ln>
+            <a:solidFill>
+              <a:schemeClr val="bg1"/>
+            </a:solidFill>
+          </a:ln>
+        </p:spPr>
+        <p:style>
+          <a:lnRef idx="1">
+            <a:schemeClr val="accent1"/>
+          </a:lnRef>
+          <a:fillRef idx="0">
+            <a:schemeClr val="accent1"/>
+          </a:fillRef>
+          <a:effectRef idx="0">
+            <a:schemeClr val="accent1"/>
+          </a:effectRef>
+          <a:fontRef idx="minor">
+            <a:schemeClr val="tx1"/>
+          </a:fontRef>
+        </p:style>
+      </p:cxnSp>
+      <p:cxnSp>
+        <p:nvCxnSpPr>
+          <p:cNvPr id="19" name="Straight Connector 18"/>
+          <p:cNvCxnSpPr/>
+          <p:nvPr/>
+        </p:nvCxnSpPr>
+        <p:spPr>
+          <a:xfrm>
+            <a:off x="4831650" y="3018039"/>
+            <a:ext cx="0" cy="468000"/>
+          </a:xfrm>
+          <a:prstGeom prst="line">
+            <a:avLst/>
+          </a:prstGeom>
+          <a:ln>
+            <a:solidFill>
+              <a:schemeClr val="bg1"/>
+            </a:solidFill>
+          </a:ln>
+        </p:spPr>
+        <p:style>
+          <a:lnRef idx="1">
+            <a:schemeClr val="accent1"/>
+          </a:lnRef>
+          <a:fillRef idx="0">
+            <a:schemeClr val="accent1"/>
+          </a:fillRef>
+          <a:effectRef idx="0">
+            <a:schemeClr val="accent1"/>
+          </a:effectRef>
+          <a:fontRef idx="minor">
+            <a:schemeClr val="tx1"/>
+          </a:fontRef>
+        </p:style>
+      </p:cxnSp>
+      <p:cxnSp>
+        <p:nvCxnSpPr>
+          <p:cNvPr id="22" name="Straight Connector 21"/>
+          <p:cNvCxnSpPr/>
+          <p:nvPr/>
+        </p:nvCxnSpPr>
+        <p:spPr>
+          <a:xfrm>
+            <a:off x="4619719" y="3019469"/>
+            <a:ext cx="216000" cy="0"/>
+          </a:xfrm>
+          <a:prstGeom prst="line">
+            <a:avLst/>
+          </a:prstGeom>
+          <a:ln>
+            <a:solidFill>
+              <a:schemeClr val="bg1"/>
+            </a:solidFill>
+          </a:ln>
+        </p:spPr>
+        <p:style>
+          <a:lnRef idx="1">
+            <a:schemeClr val="accent1"/>
+          </a:lnRef>
+          <a:fillRef idx="0">
+            <a:schemeClr val="accent1"/>
+          </a:fillRef>
+          <a:effectRef idx="0">
+            <a:schemeClr val="accent1"/>
+          </a:effectRef>
+          <a:fontRef idx="minor">
+            <a:schemeClr val="tx1"/>
+          </a:fontRef>
+        </p:style>
+      </p:cxnSp>
     </p:spTree>
     <p:extLst>
       <p:ext uri="{BB962C8B-B14F-4D97-AF65-F5344CB8AC3E}">
-        <p14:creationId xmlns:p14="http://schemas.microsoft.com/office/powerpoint/2010/main" val="2007415530"/>
+        <p14:creationId xmlns:p14="http://schemas.microsoft.com/office/powerpoint/2010/main" val="1985817931"/>
       </p:ext>
     </p:extLst>
   </p:cSld>
@@ -3296,8 +3442,8 @@
         </p:nvSpPr>
         <p:spPr>
           <a:xfrm>
-            <a:off x="2909455" y="1828800"/>
-            <a:ext cx="4871258" cy="4438996"/>
+            <a:off x="356755" y="95250"/>
+            <a:ext cx="7501370" cy="4810126"/>
           </a:xfrm>
           <a:prstGeom prst="rect">
             <a:avLst/>
@@ -3342,7 +3488,7 @@
         </p:nvCxnSpPr>
         <p:spPr>
           <a:xfrm>
-            <a:off x="3566160" y="2360814"/>
+            <a:off x="603885" y="420095"/>
             <a:ext cx="2219497" cy="0"/>
           </a:xfrm>
           <a:prstGeom prst="line">
@@ -3377,8 +3523,8 @@
         </p:nvCxnSpPr>
         <p:spPr>
           <a:xfrm>
-            <a:off x="5785657" y="2360814"/>
-            <a:ext cx="0" cy="2219498"/>
+            <a:off x="2823382" y="417714"/>
+            <a:ext cx="0" cy="2402379"/>
           </a:xfrm>
           <a:prstGeom prst="line">
             <a:avLst/>
@@ -3412,8 +3558,8 @@
         </p:nvCxnSpPr>
         <p:spPr>
           <a:xfrm>
-            <a:off x="5785657" y="4580312"/>
-            <a:ext cx="1221972" cy="0"/>
+            <a:off x="3301287" y="3287293"/>
+            <a:ext cx="1639417" cy="0"/>
           </a:xfrm>
           <a:prstGeom prst="line">
             <a:avLst/>
@@ -3447,8 +3593,8 @@
         </p:nvCxnSpPr>
         <p:spPr>
           <a:xfrm>
-            <a:off x="7007629" y="4580312"/>
-            <a:ext cx="0" cy="1346663"/>
+            <a:off x="4940704" y="3284912"/>
+            <a:ext cx="0" cy="1341901"/>
           </a:xfrm>
           <a:prstGeom prst="line">
             <a:avLst/>
@@ -3482,7 +3628,7 @@
         </p:nvCxnSpPr>
         <p:spPr>
           <a:xfrm>
-            <a:off x="3566160" y="2360814"/>
+            <a:off x="603885" y="417714"/>
             <a:ext cx="0" cy="2402379"/>
           </a:xfrm>
           <a:prstGeom prst="line">
@@ -3517,8 +3663,8 @@
         </p:nvCxnSpPr>
         <p:spPr>
           <a:xfrm>
-            <a:off x="5368212" y="4763193"/>
-            <a:ext cx="0" cy="1163782"/>
+            <a:off x="3301287" y="3284912"/>
+            <a:ext cx="0" cy="1346663"/>
           </a:xfrm>
           <a:prstGeom prst="line">
             <a:avLst/>
@@ -3552,8 +3698,8 @@
         </p:nvCxnSpPr>
         <p:spPr>
           <a:xfrm>
-            <a:off x="5368212" y="5926975"/>
-            <a:ext cx="1639417" cy="0"/>
+            <a:off x="3303668" y="4626813"/>
+            <a:ext cx="1637036" cy="0"/>
           </a:xfrm>
           <a:prstGeom prst="line">
             <a:avLst/>
@@ -3587,8 +3733,8 @@
         </p:nvCxnSpPr>
         <p:spPr>
           <a:xfrm>
-            <a:off x="3566160" y="4763193"/>
-            <a:ext cx="1802052" cy="0"/>
+            <a:off x="603885" y="2820093"/>
+            <a:ext cx="2219497" cy="0"/>
           </a:xfrm>
           <a:prstGeom prst="line">
             <a:avLst/>
@@ -3616,14 +3762,14 @@
       </p:cxnSp>
       <p:cxnSp>
         <p:nvCxnSpPr>
-          <p:cNvPr id="21" name="Straight Connector 20"/>
+          <p:cNvPr id="16" name="Straight Connector 15"/>
           <p:cNvCxnSpPr/>
           <p:nvPr/>
         </p:nvCxnSpPr>
         <p:spPr>
           <a:xfrm>
-            <a:off x="5368212" y="2360814"/>
-            <a:ext cx="0" cy="2402379"/>
+            <a:off x="3009994" y="3286169"/>
+            <a:ext cx="288000" cy="0"/>
           </a:xfrm>
           <a:prstGeom prst="line">
             <a:avLst/>
@@ -3649,10 +3795,325 @@
           </a:fontRef>
         </p:style>
       </p:cxnSp>
+      <p:cxnSp>
+        <p:nvCxnSpPr>
+          <p:cNvPr id="19" name="Straight Connector 18"/>
+          <p:cNvCxnSpPr/>
+          <p:nvPr/>
+        </p:nvCxnSpPr>
+        <p:spPr>
+          <a:xfrm>
+            <a:off x="3012375" y="2818014"/>
+            <a:ext cx="0" cy="468000"/>
+          </a:xfrm>
+          <a:prstGeom prst="line">
+            <a:avLst/>
+          </a:prstGeom>
+          <a:ln>
+            <a:solidFill>
+              <a:schemeClr val="bg1"/>
+            </a:solidFill>
+          </a:ln>
+        </p:spPr>
+        <p:style>
+          <a:lnRef idx="1">
+            <a:schemeClr val="accent1"/>
+          </a:lnRef>
+          <a:fillRef idx="0">
+            <a:schemeClr val="accent1"/>
+          </a:fillRef>
+          <a:effectRef idx="0">
+            <a:schemeClr val="accent1"/>
+          </a:effectRef>
+          <a:fontRef idx="minor">
+            <a:schemeClr val="tx1"/>
+          </a:fontRef>
+        </p:style>
+      </p:cxnSp>
+      <p:cxnSp>
+        <p:nvCxnSpPr>
+          <p:cNvPr id="22" name="Straight Connector 21"/>
+          <p:cNvCxnSpPr/>
+          <p:nvPr/>
+        </p:nvCxnSpPr>
+        <p:spPr>
+          <a:xfrm>
+            <a:off x="2800444" y="2819444"/>
+            <a:ext cx="216000" cy="0"/>
+          </a:xfrm>
+          <a:prstGeom prst="line">
+            <a:avLst/>
+          </a:prstGeom>
+          <a:ln>
+            <a:solidFill>
+              <a:schemeClr val="bg1"/>
+            </a:solidFill>
+          </a:ln>
+        </p:spPr>
+        <p:style>
+          <a:lnRef idx="1">
+            <a:schemeClr val="accent1"/>
+          </a:lnRef>
+          <a:fillRef idx="0">
+            <a:schemeClr val="accent1"/>
+          </a:fillRef>
+          <a:effectRef idx="0">
+            <a:schemeClr val="accent1"/>
+          </a:effectRef>
+          <a:fontRef idx="minor">
+            <a:schemeClr val="tx1"/>
+          </a:fontRef>
+        </p:style>
+      </p:cxnSp>
+      <p:cxnSp>
+        <p:nvCxnSpPr>
+          <p:cNvPr id="35" name="Straight Connector 34"/>
+          <p:cNvCxnSpPr/>
+          <p:nvPr/>
+        </p:nvCxnSpPr>
+        <p:spPr>
+          <a:xfrm>
+            <a:off x="5363179" y="417323"/>
+            <a:ext cx="2219497" cy="0"/>
+          </a:xfrm>
+          <a:prstGeom prst="line">
+            <a:avLst/>
+          </a:prstGeom>
+          <a:ln>
+            <a:solidFill>
+              <a:schemeClr val="bg1"/>
+            </a:solidFill>
+          </a:ln>
+        </p:spPr>
+        <p:style>
+          <a:lnRef idx="1">
+            <a:schemeClr val="accent1"/>
+          </a:lnRef>
+          <a:fillRef idx="0">
+            <a:schemeClr val="accent1"/>
+          </a:fillRef>
+          <a:effectRef idx="0">
+            <a:schemeClr val="accent1"/>
+          </a:effectRef>
+          <a:fontRef idx="minor">
+            <a:schemeClr val="tx1"/>
+          </a:fontRef>
+        </p:style>
+      </p:cxnSp>
+      <p:cxnSp>
+        <p:nvCxnSpPr>
+          <p:cNvPr id="36" name="Straight Connector 35"/>
+          <p:cNvCxnSpPr/>
+          <p:nvPr/>
+        </p:nvCxnSpPr>
+        <p:spPr>
+          <a:xfrm>
+            <a:off x="7582676" y="414942"/>
+            <a:ext cx="0" cy="2402379"/>
+          </a:xfrm>
+          <a:prstGeom prst="line">
+            <a:avLst/>
+          </a:prstGeom>
+          <a:ln>
+            <a:solidFill>
+              <a:schemeClr val="bg1"/>
+            </a:solidFill>
+          </a:ln>
+        </p:spPr>
+        <p:style>
+          <a:lnRef idx="1">
+            <a:schemeClr val="accent1"/>
+          </a:lnRef>
+          <a:fillRef idx="0">
+            <a:schemeClr val="accent1"/>
+          </a:fillRef>
+          <a:effectRef idx="0">
+            <a:schemeClr val="accent1"/>
+          </a:effectRef>
+          <a:fontRef idx="minor">
+            <a:schemeClr val="tx1"/>
+          </a:fontRef>
+        </p:style>
+      </p:cxnSp>
+      <p:cxnSp>
+        <p:nvCxnSpPr>
+          <p:cNvPr id="37" name="Straight Connector 36"/>
+          <p:cNvCxnSpPr/>
+          <p:nvPr/>
+        </p:nvCxnSpPr>
+        <p:spPr>
+          <a:xfrm>
+            <a:off x="5363179" y="414942"/>
+            <a:ext cx="0" cy="2402379"/>
+          </a:xfrm>
+          <a:prstGeom prst="line">
+            <a:avLst/>
+          </a:prstGeom>
+          <a:ln>
+            <a:solidFill>
+              <a:schemeClr val="bg1"/>
+            </a:solidFill>
+          </a:ln>
+        </p:spPr>
+        <p:style>
+          <a:lnRef idx="1">
+            <a:schemeClr val="accent1"/>
+          </a:lnRef>
+          <a:fillRef idx="0">
+            <a:schemeClr val="accent1"/>
+          </a:fillRef>
+          <a:effectRef idx="0">
+            <a:schemeClr val="accent1"/>
+          </a:effectRef>
+          <a:fontRef idx="minor">
+            <a:schemeClr val="tx1"/>
+          </a:fontRef>
+        </p:style>
+      </p:cxnSp>
+      <p:cxnSp>
+        <p:nvCxnSpPr>
+          <p:cNvPr id="38" name="Straight Connector 37"/>
+          <p:cNvCxnSpPr/>
+          <p:nvPr/>
+        </p:nvCxnSpPr>
+        <p:spPr>
+          <a:xfrm>
+            <a:off x="5363179" y="2817321"/>
+            <a:ext cx="2219497" cy="0"/>
+          </a:xfrm>
+          <a:prstGeom prst="line">
+            <a:avLst/>
+          </a:prstGeom>
+          <a:ln>
+            <a:solidFill>
+              <a:schemeClr val="bg1"/>
+            </a:solidFill>
+          </a:ln>
+        </p:spPr>
+        <p:style>
+          <a:lnRef idx="1">
+            <a:schemeClr val="accent1"/>
+          </a:lnRef>
+          <a:fillRef idx="0">
+            <a:schemeClr val="accent1"/>
+          </a:fillRef>
+          <a:effectRef idx="0">
+            <a:schemeClr val="accent1"/>
+          </a:effectRef>
+          <a:fontRef idx="minor">
+            <a:schemeClr val="tx1"/>
+          </a:fontRef>
+        </p:style>
+      </p:cxnSp>
+      <p:cxnSp>
+        <p:nvCxnSpPr>
+          <p:cNvPr id="39" name="Straight Connector 38"/>
+          <p:cNvCxnSpPr/>
+          <p:nvPr/>
+        </p:nvCxnSpPr>
+        <p:spPr>
+          <a:xfrm>
+            <a:off x="4940704" y="3287410"/>
+            <a:ext cx="216000" cy="0"/>
+          </a:xfrm>
+          <a:prstGeom prst="line">
+            <a:avLst/>
+          </a:prstGeom>
+          <a:ln>
+            <a:solidFill>
+              <a:schemeClr val="bg1"/>
+            </a:solidFill>
+          </a:ln>
+        </p:spPr>
+        <p:style>
+          <a:lnRef idx="1">
+            <a:schemeClr val="accent1"/>
+          </a:lnRef>
+          <a:fillRef idx="0">
+            <a:schemeClr val="accent1"/>
+          </a:fillRef>
+          <a:effectRef idx="0">
+            <a:schemeClr val="accent1"/>
+          </a:effectRef>
+          <a:fontRef idx="minor">
+            <a:schemeClr val="tx1"/>
+          </a:fontRef>
+        </p:style>
+      </p:cxnSp>
+      <p:cxnSp>
+        <p:nvCxnSpPr>
+          <p:cNvPr id="40" name="Straight Connector 39"/>
+          <p:cNvCxnSpPr/>
+          <p:nvPr/>
+        </p:nvCxnSpPr>
+        <p:spPr>
+          <a:xfrm>
+            <a:off x="5154270" y="2817321"/>
+            <a:ext cx="0" cy="468000"/>
+          </a:xfrm>
+          <a:prstGeom prst="line">
+            <a:avLst/>
+          </a:prstGeom>
+          <a:ln>
+            <a:solidFill>
+              <a:schemeClr val="bg1"/>
+            </a:solidFill>
+          </a:ln>
+        </p:spPr>
+        <p:style>
+          <a:lnRef idx="1">
+            <a:schemeClr val="accent1"/>
+          </a:lnRef>
+          <a:fillRef idx="0">
+            <a:schemeClr val="accent1"/>
+          </a:fillRef>
+          <a:effectRef idx="0">
+            <a:schemeClr val="accent1"/>
+          </a:effectRef>
+          <a:fontRef idx="minor">
+            <a:schemeClr val="tx1"/>
+          </a:fontRef>
+        </p:style>
+      </p:cxnSp>
+      <p:cxnSp>
+        <p:nvCxnSpPr>
+          <p:cNvPr id="41" name="Straight Connector 40"/>
+          <p:cNvCxnSpPr/>
+          <p:nvPr/>
+        </p:nvCxnSpPr>
+        <p:spPr>
+          <a:xfrm>
+            <a:off x="5154089" y="2818014"/>
+            <a:ext cx="216000" cy="0"/>
+          </a:xfrm>
+          <a:prstGeom prst="line">
+            <a:avLst/>
+          </a:prstGeom>
+          <a:ln>
+            <a:solidFill>
+              <a:schemeClr val="bg1"/>
+            </a:solidFill>
+          </a:ln>
+        </p:spPr>
+        <p:style>
+          <a:lnRef idx="1">
+            <a:schemeClr val="accent1"/>
+          </a:lnRef>
+          <a:fillRef idx="0">
+            <a:schemeClr val="accent1"/>
+          </a:fillRef>
+          <a:effectRef idx="0">
+            <a:schemeClr val="accent1"/>
+          </a:effectRef>
+          <a:fontRef idx="minor">
+            <a:schemeClr val="tx1"/>
+          </a:fontRef>
+        </p:style>
+      </p:cxnSp>
     </p:spTree>
     <p:extLst>
       <p:ext uri="{BB962C8B-B14F-4D97-AF65-F5344CB8AC3E}">
-        <p14:creationId xmlns:p14="http://schemas.microsoft.com/office/powerpoint/2010/main" val="1985817931"/>
+        <p14:creationId xmlns:p14="http://schemas.microsoft.com/office/powerpoint/2010/main" val="228806230"/>
       </p:ext>
     </p:extLst>
   </p:cSld>
@@ -3681,14 +4142,14 @@
       </p:grpSpPr>
       <p:sp>
         <p:nvSpPr>
-          <p:cNvPr id="4" name="Rectangle 3"/>
+          <p:cNvPr id="7" name="Rectangle 6"/>
           <p:cNvSpPr/>
           <p:nvPr/>
         </p:nvSpPr>
         <p:spPr>
           <a:xfrm>
-            <a:off x="4153648" y="1763059"/>
-            <a:ext cx="4566023" cy="4350870"/>
+            <a:off x="356755" y="95250"/>
+            <a:ext cx="7501370" cy="4810126"/>
           </a:xfrm>
           <a:prstGeom prst="rect">
             <a:avLst/>
@@ -3725,154 +4186,16 @@
           </a:p>
         </p:txBody>
       </p:sp>
-      <p:sp>
-        <p:nvSpPr>
-          <p:cNvPr id="30" name="Rectangle 29"/>
-          <p:cNvSpPr/>
-          <p:nvPr/>
-        </p:nvSpPr>
-        <p:spPr>
-          <a:xfrm>
-            <a:off x="5504329" y="3155577"/>
-            <a:ext cx="1900518" cy="1583765"/>
-          </a:xfrm>
-          <a:prstGeom prst="rect">
-            <a:avLst/>
-          </a:prstGeom>
-          <a:noFill/>
-          <a:ln w="6350">
-            <a:solidFill>
-              <a:schemeClr val="bg1"/>
-            </a:solidFill>
-          </a:ln>
-        </p:spPr>
-        <p:style>
-          <a:lnRef idx="2">
-            <a:schemeClr val="accent1">
-              <a:shade val="50000"/>
-            </a:schemeClr>
-          </a:lnRef>
-          <a:fillRef idx="1">
-            <a:schemeClr val="accent1"/>
-          </a:fillRef>
-          <a:effectRef idx="0">
-            <a:schemeClr val="accent1"/>
-          </a:effectRef>
-          <a:fontRef idx="minor">
-            <a:schemeClr val="lt1"/>
-          </a:fontRef>
-        </p:style>
-        <p:txBody>
-          <a:bodyPr rtlCol="0" anchor="ctr"/>
-          <a:lstStyle/>
-          <a:p>
-            <a:pPr algn="ctr"/>
-            <a:endParaRPr lang="nl-NL"/>
-          </a:p>
-        </p:txBody>
-      </p:sp>
-      <p:sp>
-        <p:nvSpPr>
-          <p:cNvPr id="31" name="Rectangle 30"/>
-          <p:cNvSpPr/>
-          <p:nvPr/>
-        </p:nvSpPr>
-        <p:spPr>
-          <a:xfrm>
-            <a:off x="5068047" y="2695388"/>
-            <a:ext cx="2794000" cy="2501155"/>
-          </a:xfrm>
-          <a:prstGeom prst="rect">
-            <a:avLst/>
-          </a:prstGeom>
-          <a:noFill/>
-          <a:ln w="6350">
-            <a:solidFill>
-              <a:schemeClr val="bg1"/>
-            </a:solidFill>
-          </a:ln>
-        </p:spPr>
-        <p:style>
-          <a:lnRef idx="2">
-            <a:schemeClr val="accent1">
-              <a:shade val="50000"/>
-            </a:schemeClr>
-          </a:lnRef>
-          <a:fillRef idx="1">
-            <a:schemeClr val="accent1"/>
-          </a:fillRef>
-          <a:effectRef idx="0">
-            <a:schemeClr val="accent1"/>
-          </a:effectRef>
-          <a:fontRef idx="minor">
-            <a:schemeClr val="lt1"/>
-          </a:fontRef>
-        </p:style>
-        <p:txBody>
-          <a:bodyPr rtlCol="0" anchor="ctr"/>
-          <a:lstStyle/>
-          <a:p>
-            <a:pPr algn="ctr"/>
-            <a:endParaRPr lang="nl-NL"/>
-          </a:p>
-        </p:txBody>
-      </p:sp>
-      <p:sp>
-        <p:nvSpPr>
-          <p:cNvPr id="32" name="Rectangle 31"/>
-          <p:cNvSpPr/>
-          <p:nvPr/>
-        </p:nvSpPr>
-        <p:spPr>
-          <a:xfrm>
-            <a:off x="4601882" y="2217271"/>
-            <a:ext cx="3696447" cy="3439461"/>
-          </a:xfrm>
-          <a:prstGeom prst="rect">
-            <a:avLst/>
-          </a:prstGeom>
-          <a:noFill/>
-          <a:ln w="6350">
-            <a:solidFill>
-              <a:schemeClr val="bg1"/>
-            </a:solidFill>
-          </a:ln>
-        </p:spPr>
-        <p:style>
-          <a:lnRef idx="2">
-            <a:schemeClr val="accent1">
-              <a:shade val="50000"/>
-            </a:schemeClr>
-          </a:lnRef>
-          <a:fillRef idx="1">
-            <a:schemeClr val="accent1"/>
-          </a:fillRef>
-          <a:effectRef idx="0">
-            <a:schemeClr val="accent1"/>
-          </a:effectRef>
-          <a:fontRef idx="minor">
-            <a:schemeClr val="lt1"/>
-          </a:fontRef>
-        </p:style>
-        <p:txBody>
-          <a:bodyPr rtlCol="0" anchor="ctr"/>
-          <a:lstStyle/>
-          <a:p>
-            <a:pPr algn="ctr"/>
-            <a:endParaRPr lang="nl-NL"/>
-          </a:p>
-        </p:txBody>
-      </p:sp>
       <p:cxnSp>
         <p:nvCxnSpPr>
-          <p:cNvPr id="34" name="Straight Connector 33"/>
+          <p:cNvPr id="11" name="Straight Connector 10"/>
           <p:cNvCxnSpPr/>
           <p:nvPr/>
         </p:nvCxnSpPr>
         <p:spPr>
           <a:xfrm>
-            <a:off x="6950636" y="2217271"/>
-            <a:ext cx="0" cy="478117"/>
+            <a:off x="3301287" y="3287293"/>
+            <a:ext cx="1639417" cy="0"/>
           </a:xfrm>
           <a:prstGeom prst="line">
             <a:avLst/>
@@ -3900,14 +4223,14 @@
       </p:cxnSp>
       <p:cxnSp>
         <p:nvCxnSpPr>
-          <p:cNvPr id="35" name="Straight Connector 34"/>
+          <p:cNvPr id="13" name="Straight Connector 12"/>
           <p:cNvCxnSpPr/>
           <p:nvPr/>
         </p:nvCxnSpPr>
         <p:spPr>
           <a:xfrm>
-            <a:off x="7168777" y="4739342"/>
-            <a:ext cx="8964" cy="457201"/>
+            <a:off x="4940704" y="3284912"/>
+            <a:ext cx="0" cy="1341901"/>
           </a:xfrm>
           <a:prstGeom prst="line">
             <a:avLst/>
@@ -3935,14 +4258,14 @@
       </p:cxnSp>
       <p:cxnSp>
         <p:nvCxnSpPr>
-          <p:cNvPr id="39" name="Straight Connector 38"/>
+          <p:cNvPr id="16" name="Straight Connector 15"/>
           <p:cNvCxnSpPr/>
           <p:nvPr/>
         </p:nvCxnSpPr>
         <p:spPr>
-          <a:xfrm flipH="1">
-            <a:off x="7404847" y="3346827"/>
-            <a:ext cx="457201" cy="0"/>
+          <a:xfrm>
+            <a:off x="3301287" y="3284912"/>
+            <a:ext cx="0" cy="1346663"/>
           </a:xfrm>
           <a:prstGeom prst="line">
             <a:avLst/>
@@ -3970,14 +4293,14 @@
       </p:cxnSp>
       <p:cxnSp>
         <p:nvCxnSpPr>
-          <p:cNvPr id="42" name="Straight Connector 41"/>
+          <p:cNvPr id="18" name="Straight Connector 17"/>
           <p:cNvCxnSpPr/>
           <p:nvPr/>
         </p:nvCxnSpPr>
         <p:spPr>
-          <a:xfrm flipH="1">
-            <a:off x="4601882" y="2971800"/>
-            <a:ext cx="466166" cy="0"/>
+          <a:xfrm>
+            <a:off x="3303668" y="4626813"/>
+            <a:ext cx="1637036" cy="0"/>
           </a:xfrm>
           <a:prstGeom prst="line">
             <a:avLst/>
@@ -4003,80 +4326,10 @@
           </a:fontRef>
         </p:style>
       </p:cxnSp>
-      <p:cxnSp>
-        <p:nvCxnSpPr>
-          <p:cNvPr id="44" name="Straight Connector 43"/>
-          <p:cNvCxnSpPr/>
-          <p:nvPr/>
-        </p:nvCxnSpPr>
-        <p:spPr>
-          <a:xfrm flipH="1">
-            <a:off x="5068047" y="4433048"/>
-            <a:ext cx="436282" cy="1493"/>
-          </a:xfrm>
-          <a:prstGeom prst="line">
-            <a:avLst/>
-          </a:prstGeom>
-          <a:ln>
-            <a:solidFill>
-              <a:schemeClr val="bg1"/>
-            </a:solidFill>
-          </a:ln>
-        </p:spPr>
-        <p:style>
-          <a:lnRef idx="1">
-            <a:schemeClr val="accent1"/>
-          </a:lnRef>
-          <a:fillRef idx="0">
-            <a:schemeClr val="accent1"/>
-          </a:fillRef>
-          <a:effectRef idx="0">
-            <a:schemeClr val="accent1"/>
-          </a:effectRef>
-          <a:fontRef idx="minor">
-            <a:schemeClr val="tx1"/>
-          </a:fontRef>
-        </p:style>
-      </p:cxnSp>
-      <p:cxnSp>
-        <p:nvCxnSpPr>
-          <p:cNvPr id="46" name="Straight Connector 45"/>
-          <p:cNvCxnSpPr/>
-          <p:nvPr/>
-        </p:nvCxnSpPr>
-        <p:spPr>
-          <a:xfrm flipH="1" flipV="1">
-            <a:off x="7862047" y="4566024"/>
-            <a:ext cx="436284" cy="2992"/>
-          </a:xfrm>
-          <a:prstGeom prst="line">
-            <a:avLst/>
-          </a:prstGeom>
-          <a:ln>
-            <a:solidFill>
-              <a:schemeClr val="bg1"/>
-            </a:solidFill>
-          </a:ln>
-        </p:spPr>
-        <p:style>
-          <a:lnRef idx="1">
-            <a:schemeClr val="accent1"/>
-          </a:lnRef>
-          <a:fillRef idx="0">
-            <a:schemeClr val="accent1"/>
-          </a:fillRef>
-          <a:effectRef idx="0">
-            <a:schemeClr val="accent1"/>
-          </a:effectRef>
-          <a:fontRef idx="minor">
-            <a:schemeClr val="tx1"/>
-          </a:fontRef>
-        </p:style>
-      </p:cxnSp>
     </p:spTree>
     <p:extLst>
       <p:ext uri="{BB962C8B-B14F-4D97-AF65-F5344CB8AC3E}">
-        <p14:creationId xmlns:p14="http://schemas.microsoft.com/office/powerpoint/2010/main" val="2055217728"/>
+        <p14:creationId xmlns:p14="http://schemas.microsoft.com/office/powerpoint/2010/main" val="1541075144"/>
       </p:ext>
     </p:extLst>
   </p:cSld>
@@ -4111,8 +4364,8 @@
         </p:nvSpPr>
         <p:spPr>
           <a:xfrm>
-            <a:off x="2931758" y="1014761"/>
-            <a:ext cx="4871258" cy="4438996"/>
+            <a:off x="356755" y="95250"/>
+            <a:ext cx="7501370" cy="4810126"/>
           </a:xfrm>
           <a:prstGeom prst="rect">
             <a:avLst/>
@@ -4151,19 +4404,19 @@
       </p:sp>
       <p:cxnSp>
         <p:nvCxnSpPr>
-          <p:cNvPr id="13" name="Straight Connector 12"/>
+          <p:cNvPr id="5" name="Straight Connector 4"/>
           <p:cNvCxnSpPr/>
           <p:nvPr/>
         </p:nvCxnSpPr>
         <p:spPr>
           <a:xfrm>
-            <a:off x="4222727" y="2044513"/>
+            <a:off x="603885" y="420095"/>
             <a:ext cx="2219497" cy="0"/>
           </a:xfrm>
           <a:prstGeom prst="line">
             <a:avLst/>
           </a:prstGeom>
-          <a:ln w="12700">
+          <a:ln>
             <a:solidFill>
               <a:schemeClr val="bg1"/>
             </a:solidFill>
@@ -4186,19 +4439,19 @@
       </p:cxnSp>
       <p:cxnSp>
         <p:nvCxnSpPr>
-          <p:cNvPr id="14" name="Straight Connector 13"/>
+          <p:cNvPr id="6" name="Straight Connector 5"/>
           <p:cNvCxnSpPr/>
           <p:nvPr/>
         </p:nvCxnSpPr>
         <p:spPr>
           <a:xfrm>
-            <a:off x="6442224" y="2044513"/>
+            <a:off x="2823382" y="417714"/>
             <a:ext cx="0" cy="2402379"/>
           </a:xfrm>
           <a:prstGeom prst="line">
             <a:avLst/>
           </a:prstGeom>
-          <a:ln w="12700">
+          <a:ln>
             <a:solidFill>
               <a:schemeClr val="bg1"/>
             </a:solidFill>
@@ -4221,19 +4474,19 @@
       </p:cxnSp>
       <p:cxnSp>
         <p:nvCxnSpPr>
-          <p:cNvPr id="15" name="Straight Connector 14"/>
+          <p:cNvPr id="7" name="Straight Connector 6"/>
           <p:cNvCxnSpPr/>
           <p:nvPr/>
         </p:nvCxnSpPr>
         <p:spPr>
-          <a:xfrm flipV="1">
-            <a:off x="4222727" y="4446895"/>
-            <a:ext cx="2219497" cy="2873"/>
+          <a:xfrm>
+            <a:off x="603885" y="417714"/>
+            <a:ext cx="0" cy="2402379"/>
           </a:xfrm>
           <a:prstGeom prst="line">
             <a:avLst/>
           </a:prstGeom>
-          <a:ln w="12700">
+          <a:ln>
             <a:solidFill>
               <a:schemeClr val="bg1"/>
             </a:solidFill>
@@ -4256,19 +4509,130 @@
       </p:cxnSp>
       <p:cxnSp>
         <p:nvCxnSpPr>
-          <p:cNvPr id="16" name="Straight Connector 15"/>
+          <p:cNvPr id="8" name="Straight Connector 7"/>
           <p:cNvCxnSpPr/>
           <p:nvPr/>
         </p:nvCxnSpPr>
         <p:spPr>
           <a:xfrm>
-            <a:off x="5880444" y="1595886"/>
-            <a:ext cx="2771" cy="448627"/>
+            <a:off x="603885" y="2820093"/>
+            <a:ext cx="2219497" cy="0"/>
           </a:xfrm>
           <a:prstGeom prst="line">
             <a:avLst/>
           </a:prstGeom>
-          <a:ln w="12700">
+          <a:ln>
+            <a:solidFill>
+              <a:schemeClr val="bg1"/>
+            </a:solidFill>
+          </a:ln>
+        </p:spPr>
+        <p:style>
+          <a:lnRef idx="1">
+            <a:schemeClr val="accent1"/>
+          </a:lnRef>
+          <a:fillRef idx="0">
+            <a:schemeClr val="accent1"/>
+          </a:fillRef>
+          <a:effectRef idx="0">
+            <a:schemeClr val="accent1"/>
+          </a:effectRef>
+          <a:fontRef idx="minor">
+            <a:schemeClr val="tx1"/>
+          </a:fontRef>
+        </p:style>
+      </p:cxnSp>
+    </p:spTree>
+    <p:extLst>
+      <p:ext uri="{BB962C8B-B14F-4D97-AF65-F5344CB8AC3E}">
+        <p14:creationId xmlns:p14="http://schemas.microsoft.com/office/powerpoint/2010/main" val="3183901185"/>
+      </p:ext>
+    </p:extLst>
+  </p:cSld>
+  <p:clrMapOvr>
+    <a:masterClrMapping/>
+  </p:clrMapOvr>
+</p:sld>
+</file>
+
+<file path=ppt/slides/slide5.xml><?xml version="1.0" encoding="utf-8"?>
+<p:sld xmlns:a="http://schemas.openxmlformats.org/drawingml/2006/main" xmlns:r="http://schemas.openxmlformats.org/officeDocument/2006/relationships" xmlns:p="http://schemas.openxmlformats.org/presentationml/2006/main">
+  <p:cSld>
+    <p:spTree>
+      <p:nvGrpSpPr>
+        <p:cNvPr id="1" name=""/>
+        <p:cNvGrpSpPr/>
+        <p:nvPr/>
+      </p:nvGrpSpPr>
+      <p:grpSpPr>
+        <a:xfrm>
+          <a:off x="0" y="0"/>
+          <a:ext cx="0" cy="0"/>
+          <a:chOff x="0" y="0"/>
+          <a:chExt cx="0" cy="0"/>
+        </a:xfrm>
+      </p:grpSpPr>
+      <p:sp>
+        <p:nvSpPr>
+          <p:cNvPr id="4" name="Rectangle 3"/>
+          <p:cNvSpPr/>
+          <p:nvPr/>
+        </p:nvSpPr>
+        <p:spPr>
+          <a:xfrm>
+            <a:off x="356755" y="95250"/>
+            <a:ext cx="7501370" cy="4810126"/>
+          </a:xfrm>
+          <a:prstGeom prst="rect">
+            <a:avLst/>
+          </a:prstGeom>
+          <a:solidFill>
+            <a:schemeClr val="tx1"/>
+          </a:solidFill>
+          <a:ln>
+            <a:noFill/>
+          </a:ln>
+        </p:spPr>
+        <p:style>
+          <a:lnRef idx="2">
+            <a:schemeClr val="accent1">
+              <a:shade val="50000"/>
+            </a:schemeClr>
+          </a:lnRef>
+          <a:fillRef idx="1">
+            <a:schemeClr val="accent1"/>
+          </a:fillRef>
+          <a:effectRef idx="0">
+            <a:schemeClr val="accent1"/>
+          </a:effectRef>
+          <a:fontRef idx="minor">
+            <a:schemeClr val="lt1"/>
+          </a:fontRef>
+        </p:style>
+        <p:txBody>
+          <a:bodyPr rtlCol="0" anchor="ctr"/>
+          <a:lstStyle/>
+          <a:p>
+            <a:pPr algn="ctr"/>
+            <a:endParaRPr lang="nl-NL"/>
+          </a:p>
+        </p:txBody>
+      </p:sp>
+      <p:cxnSp>
+        <p:nvCxnSpPr>
+          <p:cNvPr id="35" name="Straight Connector 34"/>
+          <p:cNvCxnSpPr/>
+          <p:nvPr/>
+        </p:nvCxnSpPr>
+        <p:spPr>
+          <a:xfrm>
+            <a:off x="5363179" y="417323"/>
+            <a:ext cx="2219497" cy="0"/>
+          </a:xfrm>
+          <a:prstGeom prst="line">
+            <a:avLst/>
+          </a:prstGeom>
+          <a:ln>
             <a:solidFill>
               <a:schemeClr val="bg1"/>
             </a:solidFill>
@@ -4291,19 +4655,19 @@
       </p:cxnSp>
       <p:cxnSp>
         <p:nvCxnSpPr>
-          <p:cNvPr id="17" name="Straight Connector 16"/>
+          <p:cNvPr id="36" name="Straight Connector 35"/>
           <p:cNvCxnSpPr/>
           <p:nvPr/>
         </p:nvCxnSpPr>
         <p:spPr>
           <a:xfrm>
-            <a:off x="4222727" y="2044513"/>
+            <a:off x="7582676" y="414942"/>
             <a:ext cx="0" cy="2402379"/>
           </a:xfrm>
           <a:prstGeom prst="line">
             <a:avLst/>
           </a:prstGeom>
-          <a:ln w="12700">
+          <a:ln>
             <a:solidFill>
               <a:schemeClr val="bg1"/>
             </a:solidFill>
@@ -4326,124 +4690,19 @@
       </p:cxnSp>
       <p:cxnSp>
         <p:nvCxnSpPr>
-          <p:cNvPr id="20" name="Straight Connector 19"/>
+          <p:cNvPr id="37" name="Straight Connector 36"/>
           <p:cNvCxnSpPr/>
           <p:nvPr/>
         </p:nvCxnSpPr>
         <p:spPr>
           <a:xfrm>
-            <a:off x="3754025" y="1595886"/>
-            <a:ext cx="3133897" cy="2876"/>
+            <a:off x="5363179" y="414942"/>
+            <a:ext cx="0" cy="2402379"/>
           </a:xfrm>
           <a:prstGeom prst="line">
             <a:avLst/>
           </a:prstGeom>
-          <a:ln w="12700">
-            <a:solidFill>
-              <a:schemeClr val="bg1"/>
-            </a:solidFill>
-          </a:ln>
-        </p:spPr>
-        <p:style>
-          <a:lnRef idx="1">
-            <a:schemeClr val="accent1"/>
-          </a:lnRef>
-          <a:fillRef idx="0">
-            <a:schemeClr val="accent1"/>
-          </a:fillRef>
-          <a:effectRef idx="0">
-            <a:schemeClr val="accent1"/>
-          </a:effectRef>
-          <a:fontRef idx="minor">
-            <a:schemeClr val="tx1"/>
-          </a:fontRef>
-        </p:style>
-      </p:cxnSp>
-      <p:cxnSp>
-        <p:nvCxnSpPr>
-          <p:cNvPr id="21" name="Straight Connector 20"/>
-          <p:cNvCxnSpPr/>
-          <p:nvPr/>
-        </p:nvCxnSpPr>
-        <p:spPr>
-          <a:xfrm>
-            <a:off x="6887922" y="1598762"/>
-            <a:ext cx="0" cy="3265073"/>
-          </a:xfrm>
-          <a:prstGeom prst="line">
-            <a:avLst/>
-          </a:prstGeom>
-          <a:ln w="12700">
-            <a:solidFill>
-              <a:schemeClr val="bg1"/>
-            </a:solidFill>
-          </a:ln>
-        </p:spPr>
-        <p:style>
-          <a:lnRef idx="1">
-            <a:schemeClr val="accent1"/>
-          </a:lnRef>
-          <a:fillRef idx="0">
-            <a:schemeClr val="accent1"/>
-          </a:fillRef>
-          <a:effectRef idx="0">
-            <a:schemeClr val="accent1"/>
-          </a:effectRef>
-          <a:fontRef idx="minor">
-            <a:schemeClr val="tx1"/>
-          </a:fontRef>
-        </p:style>
-      </p:cxnSp>
-      <p:cxnSp>
-        <p:nvCxnSpPr>
-          <p:cNvPr id="22" name="Straight Connector 21"/>
-          <p:cNvCxnSpPr/>
-          <p:nvPr/>
-        </p:nvCxnSpPr>
-        <p:spPr>
-          <a:xfrm>
-            <a:off x="3754025" y="4866711"/>
-            <a:ext cx="3133897" cy="1"/>
-          </a:xfrm>
-          <a:prstGeom prst="line">
-            <a:avLst/>
-          </a:prstGeom>
-          <a:ln w="12700">
-            <a:solidFill>
-              <a:schemeClr val="bg1"/>
-            </a:solidFill>
-          </a:ln>
-        </p:spPr>
-        <p:style>
-          <a:lnRef idx="1">
-            <a:schemeClr val="accent1"/>
-          </a:lnRef>
-          <a:fillRef idx="0">
-            <a:schemeClr val="accent1"/>
-          </a:fillRef>
-          <a:effectRef idx="0">
-            <a:schemeClr val="accent1"/>
-          </a:effectRef>
-          <a:fontRef idx="minor">
-            <a:schemeClr val="tx1"/>
-          </a:fontRef>
-        </p:style>
-      </p:cxnSp>
-      <p:cxnSp>
-        <p:nvCxnSpPr>
-          <p:cNvPr id="23" name="Straight Connector 22"/>
-          <p:cNvCxnSpPr/>
-          <p:nvPr/>
-        </p:nvCxnSpPr>
-        <p:spPr>
-          <a:xfrm>
-            <a:off x="3754025" y="1598762"/>
-            <a:ext cx="0" cy="3270824"/>
-          </a:xfrm>
-          <a:prstGeom prst="line">
-            <a:avLst/>
-          </a:prstGeom>
-          <a:ln w="12700">
+          <a:ln>
             <a:solidFill>
               <a:schemeClr val="bg1"/>
             </a:solidFill>
@@ -4472,13 +4731,13 @@
         </p:nvCxnSpPr>
         <p:spPr>
           <a:xfrm>
-            <a:off x="4619625" y="4446892"/>
-            <a:ext cx="1257" cy="424132"/>
+            <a:off x="5363179" y="2817321"/>
+            <a:ext cx="2219497" cy="0"/>
           </a:xfrm>
           <a:prstGeom prst="line">
             <a:avLst/>
           </a:prstGeom>
-          <a:ln w="12700">
+          <a:ln>
             <a:solidFill>
               <a:schemeClr val="bg1"/>
             </a:solidFill>
@@ -4502,7 +4761,7 @@
     </p:spTree>
     <p:extLst>
       <p:ext uri="{BB962C8B-B14F-4D97-AF65-F5344CB8AC3E}">
-        <p14:creationId xmlns:p14="http://schemas.microsoft.com/office/powerpoint/2010/main" val="4095599319"/>
+        <p14:creationId xmlns:p14="http://schemas.microsoft.com/office/powerpoint/2010/main" val="2541246263"/>
       </p:ext>
     </p:extLst>
   </p:cSld>

</xml_diff>